<commit_message>
Added pptx to binary
</commit_message>
<xml_diff>
--- a/emptyDeck.pptx
+++ b/emptyDeck.pptx
@@ -5,7 +5,7 @@
     <p:sldMasterId id="2147483648" r:id="rId1"/>
   </p:sldMasterIdLst>
   <p:notesMasterIdLst>
-    <p:notesMasterId r:id="rId53"/>
+    <p:notesMasterId r:id="rId74"/>
   </p:notesMasterIdLst>
   <p:sldIdLst>
     <p:sldId id="258" r:id="rId2"/>
@@ -58,7 +58,28 @@
     <p:sldId id="306" r:id="rId49"/>
     <p:sldId id="307" r:id="rId50"/>
     <p:sldId id="308" r:id="rId51"/>
-    <p:sldId id="281" r:id="rId52"/>
+    <p:sldId id="309" r:id="rId52"/>
+    <p:sldId id="310" r:id="rId53"/>
+    <p:sldId id="311" r:id="rId54"/>
+    <p:sldId id="312" r:id="rId55"/>
+    <p:sldId id="313" r:id="rId56"/>
+    <p:sldId id="314" r:id="rId57"/>
+    <p:sldId id="315" r:id="rId58"/>
+    <p:sldId id="316" r:id="rId59"/>
+    <p:sldId id="317" r:id="rId60"/>
+    <p:sldId id="318" r:id="rId61"/>
+    <p:sldId id="319" r:id="rId62"/>
+    <p:sldId id="320" r:id="rId63"/>
+    <p:sldId id="321" r:id="rId64"/>
+    <p:sldId id="322" r:id="rId65"/>
+    <p:sldId id="323" r:id="rId66"/>
+    <p:sldId id="324" r:id="rId67"/>
+    <p:sldId id="325" r:id="rId68"/>
+    <p:sldId id="326" r:id="rId69"/>
+    <p:sldId id="327" r:id="rId70"/>
+    <p:sldId id="328" r:id="rId71"/>
+    <p:sldId id="329" r:id="rId72"/>
+    <p:sldId id="281" r:id="rId73"/>
   </p:sldIdLst>
   <p:sldSz cx="9144000" cy="5143500" type="screen16x9"/>
   <p:notesSz cx="6858000" cy="9144000"/>
@@ -247,7 +268,7 @@
           <a:p>
             <a:fld id="{4229831F-C8BF-4C81-9259-DC456B4501DA}" type="datetimeFigureOut">
               <a:rPr lang="en-GB" smtClean="0"/>
-              <a:t>03/05/2022</a:t>
+              <a:t>07/06/2022</a:t>
             </a:fld>
             <a:endParaRPr lang="en-GB" dirty="0"/>
           </a:p>
@@ -10066,14 +10087,1086 @@
           <a:bodyPr/>
           <a:lstStyle/>
           <a:p>
-            <a:endParaRPr lang="en-US" dirty="0"/>
+            <a:r>
+              <a:rPr lang="en-US" dirty="0"/>
+              <a:t>*50*</a:t>
+            </a:r>
+          </a:p>
+        </p:txBody>
+      </p:sp>
+      <p:sp>
+        <p:nvSpPr>
+          <p:cNvPr id="4" name="TextBox 3">
+            <a:extLst>
+              <a:ext uri="{FF2B5EF4-FFF2-40B4-BE49-F238E27FC236}">
+                <a16:creationId xmlns:a16="http://schemas.microsoft.com/office/drawing/2014/main" id="{C73B122E-5230-6243-A035-151EDB99E12E}"/>
+              </a:ext>
+            </a:extLst>
+          </p:cNvPr>
+          <p:cNvSpPr txBox="1"/>
+          <p:nvPr/>
+        </p:nvSpPr>
+        <p:spPr>
+          <a:xfrm>
+            <a:off x="223837" y="447345"/>
+            <a:ext cx="6892069" cy="328612"/>
+          </a:xfrm>
+          <a:prstGeom prst="rect">
+            <a:avLst/>
+          </a:prstGeom>
+          <a:noFill/>
+        </p:spPr>
+        <p:txBody>
+          <a:bodyPr wrap="square" lIns="0" tIns="0" rIns="0" bIns="0" rtlCol="0">
+            <a:noAutofit/>
+          </a:bodyPr>
+          <a:lstStyle/>
+          <a:p>
+            <a:r>
+              <a:rPr lang="en-GB" sz="1400" i="1" dirty="0">
+                <a:latin typeface="JLR Emeric SemiBold" panose="02000503040000020004" pitchFamily="2" charset="0"/>
+              </a:rPr>
+              <a:t>State Information</a:t>
+            </a:r>
           </a:p>
         </p:txBody>
       </p:sp>
     </p:spTree>
     <p:extLst>
       <p:ext uri="{BB962C8B-B14F-4D97-AF65-F5344CB8AC3E}">
-        <p14:creationId xmlns:p14="http://schemas.microsoft.com/office/powerpoint/2010/main" val="747518252"/>
+        <p14:creationId xmlns:p14="http://schemas.microsoft.com/office/powerpoint/2010/main" val="2097895648"/>
+      </p:ext>
+    </p:extLst>
+  </p:cSld>
+  <p:clrMapOvr>
+    <a:masterClrMapping/>
+  </p:clrMapOvr>
+</p:sld>
+</file>
+
+<file path=ppt/slides/slide52.xml><?xml version="1.0" encoding="utf-8"?>
+<p:sld xmlns:a="http://schemas.openxmlformats.org/drawingml/2006/main" xmlns:r="http://schemas.openxmlformats.org/officeDocument/2006/relationships" xmlns:p="http://schemas.openxmlformats.org/presentationml/2006/main">
+  <p:cSld>
+    <p:spTree>
+      <p:nvGrpSpPr>
+        <p:cNvPr id="1" name=""/>
+        <p:cNvGrpSpPr/>
+        <p:nvPr/>
+      </p:nvGrpSpPr>
+      <p:grpSpPr>
+        <a:xfrm>
+          <a:off x="0" y="0"/>
+          <a:ext cx="0" cy="0"/>
+          <a:chOff x="0" y="0"/>
+          <a:chExt cx="0" cy="0"/>
+        </a:xfrm>
+      </p:grpSpPr>
+      <p:sp>
+        <p:nvSpPr>
+          <p:cNvPr id="2" name="Slide Number Placeholder 1">
+            <a:extLst>
+              <a:ext uri="{FF2B5EF4-FFF2-40B4-BE49-F238E27FC236}">
+                <a16:creationId xmlns:a16="http://schemas.microsoft.com/office/drawing/2014/main" id="{4CF602FA-47FB-1C42-87F9-B1D80E651C85}"/>
+              </a:ext>
+            </a:extLst>
+          </p:cNvPr>
+          <p:cNvSpPr>
+            <a:spLocks noGrp="1"/>
+          </p:cNvSpPr>
+          <p:nvPr>
+            <p:ph type="sldNum" sz="quarter" idx="12"/>
+          </p:nvPr>
+        </p:nvSpPr>
+        <p:spPr/>
+        <p:txBody>
+          <a:bodyPr/>
+          <a:lstStyle/>
+          <a:p>
+            <a:fld id="{C554A706-D19D-4C79-97F9-BC489483F7EF}" type="slidenum">
+              <a:rPr lang="en-GB" smtClean="0"/>
+              <a:t>52</a:t>
+            </a:fld>
+            <a:endParaRPr lang="en-GB" dirty="0"/>
+          </a:p>
+        </p:txBody>
+      </p:sp>
+      <p:sp>
+        <p:nvSpPr>
+          <p:cNvPr id="3" name="Title 2">
+            <a:extLst>
+              <a:ext uri="{FF2B5EF4-FFF2-40B4-BE49-F238E27FC236}">
+                <a16:creationId xmlns:a16="http://schemas.microsoft.com/office/drawing/2014/main" id="{5C8F3E15-B13C-694D-8D0F-CC5DF81C9E0E}"/>
+              </a:ext>
+            </a:extLst>
+          </p:cNvPr>
+          <p:cNvSpPr>
+            <a:spLocks noGrp="1"/>
+          </p:cNvSpPr>
+          <p:nvPr>
+            <p:ph type="title"/>
+          </p:nvPr>
+        </p:nvSpPr>
+        <p:spPr>
+          <a:xfrm>
+            <a:off x="223838" y="118733"/>
+            <a:ext cx="6629400" cy="349618"/>
+          </a:xfrm>
+        </p:spPr>
+        <p:txBody>
+          <a:bodyPr/>
+          <a:lstStyle/>
+          <a:p>
+            <a:r>
+              <a:rPr lang="en-US" dirty="0"/>
+              <a:t>*51*</a:t>
+            </a:r>
+          </a:p>
+        </p:txBody>
+      </p:sp>
+      <p:sp>
+        <p:nvSpPr>
+          <p:cNvPr id="4" name="TextBox 3">
+            <a:extLst>
+              <a:ext uri="{FF2B5EF4-FFF2-40B4-BE49-F238E27FC236}">
+                <a16:creationId xmlns:a16="http://schemas.microsoft.com/office/drawing/2014/main" id="{C73B122E-5230-6243-A035-151EDB99E12E}"/>
+              </a:ext>
+            </a:extLst>
+          </p:cNvPr>
+          <p:cNvSpPr txBox="1"/>
+          <p:nvPr/>
+        </p:nvSpPr>
+        <p:spPr>
+          <a:xfrm>
+            <a:off x="223837" y="447345"/>
+            <a:ext cx="6892069" cy="328612"/>
+          </a:xfrm>
+          <a:prstGeom prst="rect">
+            <a:avLst/>
+          </a:prstGeom>
+          <a:noFill/>
+        </p:spPr>
+        <p:txBody>
+          <a:bodyPr wrap="square" lIns="0" tIns="0" rIns="0" bIns="0" rtlCol="0">
+            <a:noAutofit/>
+          </a:bodyPr>
+          <a:lstStyle/>
+          <a:p>
+            <a:r>
+              <a:rPr lang="en-GB" sz="1400" i="1" dirty="0">
+                <a:latin typeface="JLR Emeric SemiBold" panose="02000503040000020004" pitchFamily="2" charset="0"/>
+              </a:rPr>
+              <a:t>State Information</a:t>
+            </a:r>
+          </a:p>
+        </p:txBody>
+      </p:sp>
+    </p:spTree>
+    <p:extLst>
+      <p:ext uri="{BB962C8B-B14F-4D97-AF65-F5344CB8AC3E}">
+        <p14:creationId xmlns:p14="http://schemas.microsoft.com/office/powerpoint/2010/main" val="2886322429"/>
+      </p:ext>
+    </p:extLst>
+  </p:cSld>
+  <p:clrMapOvr>
+    <a:masterClrMapping/>
+  </p:clrMapOvr>
+</p:sld>
+</file>
+
+<file path=ppt/slides/slide53.xml><?xml version="1.0" encoding="utf-8"?>
+<p:sld xmlns:a="http://schemas.openxmlformats.org/drawingml/2006/main" xmlns:r="http://schemas.openxmlformats.org/officeDocument/2006/relationships" xmlns:p="http://schemas.openxmlformats.org/presentationml/2006/main">
+  <p:cSld>
+    <p:spTree>
+      <p:nvGrpSpPr>
+        <p:cNvPr id="1" name=""/>
+        <p:cNvGrpSpPr/>
+        <p:nvPr/>
+      </p:nvGrpSpPr>
+      <p:grpSpPr>
+        <a:xfrm>
+          <a:off x="0" y="0"/>
+          <a:ext cx="0" cy="0"/>
+          <a:chOff x="0" y="0"/>
+          <a:chExt cx="0" cy="0"/>
+        </a:xfrm>
+      </p:grpSpPr>
+      <p:sp>
+        <p:nvSpPr>
+          <p:cNvPr id="2" name="Slide Number Placeholder 1">
+            <a:extLst>
+              <a:ext uri="{FF2B5EF4-FFF2-40B4-BE49-F238E27FC236}">
+                <a16:creationId xmlns:a16="http://schemas.microsoft.com/office/drawing/2014/main" id="{4CF602FA-47FB-1C42-87F9-B1D80E651C85}"/>
+              </a:ext>
+            </a:extLst>
+          </p:cNvPr>
+          <p:cNvSpPr>
+            <a:spLocks noGrp="1"/>
+          </p:cNvSpPr>
+          <p:nvPr>
+            <p:ph type="sldNum" sz="quarter" idx="12"/>
+          </p:nvPr>
+        </p:nvSpPr>
+        <p:spPr/>
+        <p:txBody>
+          <a:bodyPr/>
+          <a:lstStyle/>
+          <a:p>
+            <a:fld id="{C554A706-D19D-4C79-97F9-BC489483F7EF}" type="slidenum">
+              <a:rPr lang="en-GB" smtClean="0"/>
+              <a:t>53</a:t>
+            </a:fld>
+            <a:endParaRPr lang="en-GB" dirty="0"/>
+          </a:p>
+        </p:txBody>
+      </p:sp>
+      <p:sp>
+        <p:nvSpPr>
+          <p:cNvPr id="3" name="Title 2">
+            <a:extLst>
+              <a:ext uri="{FF2B5EF4-FFF2-40B4-BE49-F238E27FC236}">
+                <a16:creationId xmlns:a16="http://schemas.microsoft.com/office/drawing/2014/main" id="{5C8F3E15-B13C-694D-8D0F-CC5DF81C9E0E}"/>
+              </a:ext>
+            </a:extLst>
+          </p:cNvPr>
+          <p:cNvSpPr>
+            <a:spLocks noGrp="1"/>
+          </p:cNvSpPr>
+          <p:nvPr>
+            <p:ph type="title"/>
+          </p:nvPr>
+        </p:nvSpPr>
+        <p:spPr>
+          <a:xfrm>
+            <a:off x="223838" y="118733"/>
+            <a:ext cx="6629400" cy="349618"/>
+          </a:xfrm>
+        </p:spPr>
+        <p:txBody>
+          <a:bodyPr/>
+          <a:lstStyle/>
+          <a:p>
+            <a:r>
+              <a:rPr lang="en-US" dirty="0"/>
+              <a:t>*52*</a:t>
+            </a:r>
+          </a:p>
+        </p:txBody>
+      </p:sp>
+      <p:sp>
+        <p:nvSpPr>
+          <p:cNvPr id="4" name="TextBox 3">
+            <a:extLst>
+              <a:ext uri="{FF2B5EF4-FFF2-40B4-BE49-F238E27FC236}">
+                <a16:creationId xmlns:a16="http://schemas.microsoft.com/office/drawing/2014/main" id="{C73B122E-5230-6243-A035-151EDB99E12E}"/>
+              </a:ext>
+            </a:extLst>
+          </p:cNvPr>
+          <p:cNvSpPr txBox="1"/>
+          <p:nvPr/>
+        </p:nvSpPr>
+        <p:spPr>
+          <a:xfrm>
+            <a:off x="223837" y="447345"/>
+            <a:ext cx="6892069" cy="328612"/>
+          </a:xfrm>
+          <a:prstGeom prst="rect">
+            <a:avLst/>
+          </a:prstGeom>
+          <a:noFill/>
+        </p:spPr>
+        <p:txBody>
+          <a:bodyPr wrap="square" lIns="0" tIns="0" rIns="0" bIns="0" rtlCol="0">
+            <a:noAutofit/>
+          </a:bodyPr>
+          <a:lstStyle/>
+          <a:p>
+            <a:r>
+              <a:rPr lang="en-GB" sz="1400" i="1" dirty="0">
+                <a:latin typeface="JLR Emeric SemiBold" panose="02000503040000020004" pitchFamily="2" charset="0"/>
+              </a:rPr>
+              <a:t>State Information</a:t>
+            </a:r>
+          </a:p>
+        </p:txBody>
+      </p:sp>
+    </p:spTree>
+    <p:extLst>
+      <p:ext uri="{BB962C8B-B14F-4D97-AF65-F5344CB8AC3E}">
+        <p14:creationId xmlns:p14="http://schemas.microsoft.com/office/powerpoint/2010/main" val="1931067866"/>
+      </p:ext>
+    </p:extLst>
+  </p:cSld>
+  <p:clrMapOvr>
+    <a:masterClrMapping/>
+  </p:clrMapOvr>
+</p:sld>
+</file>
+
+<file path=ppt/slides/slide54.xml><?xml version="1.0" encoding="utf-8"?>
+<p:sld xmlns:a="http://schemas.openxmlformats.org/drawingml/2006/main" xmlns:r="http://schemas.openxmlformats.org/officeDocument/2006/relationships" xmlns:p="http://schemas.openxmlformats.org/presentationml/2006/main">
+  <p:cSld>
+    <p:spTree>
+      <p:nvGrpSpPr>
+        <p:cNvPr id="1" name=""/>
+        <p:cNvGrpSpPr/>
+        <p:nvPr/>
+      </p:nvGrpSpPr>
+      <p:grpSpPr>
+        <a:xfrm>
+          <a:off x="0" y="0"/>
+          <a:ext cx="0" cy="0"/>
+          <a:chOff x="0" y="0"/>
+          <a:chExt cx="0" cy="0"/>
+        </a:xfrm>
+      </p:grpSpPr>
+      <p:sp>
+        <p:nvSpPr>
+          <p:cNvPr id="2" name="Slide Number Placeholder 1">
+            <a:extLst>
+              <a:ext uri="{FF2B5EF4-FFF2-40B4-BE49-F238E27FC236}">
+                <a16:creationId xmlns:a16="http://schemas.microsoft.com/office/drawing/2014/main" id="{4CF602FA-47FB-1C42-87F9-B1D80E651C85}"/>
+              </a:ext>
+            </a:extLst>
+          </p:cNvPr>
+          <p:cNvSpPr>
+            <a:spLocks noGrp="1"/>
+          </p:cNvSpPr>
+          <p:nvPr>
+            <p:ph type="sldNum" sz="quarter" idx="12"/>
+          </p:nvPr>
+        </p:nvSpPr>
+        <p:spPr/>
+        <p:txBody>
+          <a:bodyPr/>
+          <a:lstStyle/>
+          <a:p>
+            <a:fld id="{C554A706-D19D-4C79-97F9-BC489483F7EF}" type="slidenum">
+              <a:rPr lang="en-GB" smtClean="0"/>
+              <a:t>54</a:t>
+            </a:fld>
+            <a:endParaRPr lang="en-GB" dirty="0"/>
+          </a:p>
+        </p:txBody>
+      </p:sp>
+      <p:sp>
+        <p:nvSpPr>
+          <p:cNvPr id="3" name="Title 2">
+            <a:extLst>
+              <a:ext uri="{FF2B5EF4-FFF2-40B4-BE49-F238E27FC236}">
+                <a16:creationId xmlns:a16="http://schemas.microsoft.com/office/drawing/2014/main" id="{5C8F3E15-B13C-694D-8D0F-CC5DF81C9E0E}"/>
+              </a:ext>
+            </a:extLst>
+          </p:cNvPr>
+          <p:cNvSpPr>
+            <a:spLocks noGrp="1"/>
+          </p:cNvSpPr>
+          <p:nvPr>
+            <p:ph type="title"/>
+          </p:nvPr>
+        </p:nvSpPr>
+        <p:spPr>
+          <a:xfrm>
+            <a:off x="223838" y="118733"/>
+            <a:ext cx="6629400" cy="349618"/>
+          </a:xfrm>
+        </p:spPr>
+        <p:txBody>
+          <a:bodyPr/>
+          <a:lstStyle/>
+          <a:p>
+            <a:r>
+              <a:rPr lang="en-US" dirty="0"/>
+              <a:t>*53*</a:t>
+            </a:r>
+          </a:p>
+        </p:txBody>
+      </p:sp>
+      <p:sp>
+        <p:nvSpPr>
+          <p:cNvPr id="4" name="TextBox 3">
+            <a:extLst>
+              <a:ext uri="{FF2B5EF4-FFF2-40B4-BE49-F238E27FC236}">
+                <a16:creationId xmlns:a16="http://schemas.microsoft.com/office/drawing/2014/main" id="{C73B122E-5230-6243-A035-151EDB99E12E}"/>
+              </a:ext>
+            </a:extLst>
+          </p:cNvPr>
+          <p:cNvSpPr txBox="1"/>
+          <p:nvPr/>
+        </p:nvSpPr>
+        <p:spPr>
+          <a:xfrm>
+            <a:off x="223837" y="447345"/>
+            <a:ext cx="6892069" cy="328612"/>
+          </a:xfrm>
+          <a:prstGeom prst="rect">
+            <a:avLst/>
+          </a:prstGeom>
+          <a:noFill/>
+        </p:spPr>
+        <p:txBody>
+          <a:bodyPr wrap="square" lIns="0" tIns="0" rIns="0" bIns="0" rtlCol="0">
+            <a:noAutofit/>
+          </a:bodyPr>
+          <a:lstStyle/>
+          <a:p>
+            <a:r>
+              <a:rPr lang="en-GB" sz="1400" i="1" dirty="0">
+                <a:latin typeface="JLR Emeric SemiBold" panose="02000503040000020004" pitchFamily="2" charset="0"/>
+              </a:rPr>
+              <a:t>State Information</a:t>
+            </a:r>
+          </a:p>
+        </p:txBody>
+      </p:sp>
+    </p:spTree>
+    <p:extLst>
+      <p:ext uri="{BB962C8B-B14F-4D97-AF65-F5344CB8AC3E}">
+        <p14:creationId xmlns:p14="http://schemas.microsoft.com/office/powerpoint/2010/main" val="3871572100"/>
+      </p:ext>
+    </p:extLst>
+  </p:cSld>
+  <p:clrMapOvr>
+    <a:masterClrMapping/>
+  </p:clrMapOvr>
+</p:sld>
+</file>
+
+<file path=ppt/slides/slide55.xml><?xml version="1.0" encoding="utf-8"?>
+<p:sld xmlns:a="http://schemas.openxmlformats.org/drawingml/2006/main" xmlns:r="http://schemas.openxmlformats.org/officeDocument/2006/relationships" xmlns:p="http://schemas.openxmlformats.org/presentationml/2006/main">
+  <p:cSld>
+    <p:spTree>
+      <p:nvGrpSpPr>
+        <p:cNvPr id="1" name=""/>
+        <p:cNvGrpSpPr/>
+        <p:nvPr/>
+      </p:nvGrpSpPr>
+      <p:grpSpPr>
+        <a:xfrm>
+          <a:off x="0" y="0"/>
+          <a:ext cx="0" cy="0"/>
+          <a:chOff x="0" y="0"/>
+          <a:chExt cx="0" cy="0"/>
+        </a:xfrm>
+      </p:grpSpPr>
+      <p:sp>
+        <p:nvSpPr>
+          <p:cNvPr id="2" name="Slide Number Placeholder 1">
+            <a:extLst>
+              <a:ext uri="{FF2B5EF4-FFF2-40B4-BE49-F238E27FC236}">
+                <a16:creationId xmlns:a16="http://schemas.microsoft.com/office/drawing/2014/main" id="{4CF602FA-47FB-1C42-87F9-B1D80E651C85}"/>
+              </a:ext>
+            </a:extLst>
+          </p:cNvPr>
+          <p:cNvSpPr>
+            <a:spLocks noGrp="1"/>
+          </p:cNvSpPr>
+          <p:nvPr>
+            <p:ph type="sldNum" sz="quarter" idx="12"/>
+          </p:nvPr>
+        </p:nvSpPr>
+        <p:spPr/>
+        <p:txBody>
+          <a:bodyPr/>
+          <a:lstStyle/>
+          <a:p>
+            <a:fld id="{C554A706-D19D-4C79-97F9-BC489483F7EF}" type="slidenum">
+              <a:rPr lang="en-GB" smtClean="0"/>
+              <a:t>55</a:t>
+            </a:fld>
+            <a:endParaRPr lang="en-GB" dirty="0"/>
+          </a:p>
+        </p:txBody>
+      </p:sp>
+      <p:sp>
+        <p:nvSpPr>
+          <p:cNvPr id="3" name="Title 2">
+            <a:extLst>
+              <a:ext uri="{FF2B5EF4-FFF2-40B4-BE49-F238E27FC236}">
+                <a16:creationId xmlns:a16="http://schemas.microsoft.com/office/drawing/2014/main" id="{5C8F3E15-B13C-694D-8D0F-CC5DF81C9E0E}"/>
+              </a:ext>
+            </a:extLst>
+          </p:cNvPr>
+          <p:cNvSpPr>
+            <a:spLocks noGrp="1"/>
+          </p:cNvSpPr>
+          <p:nvPr>
+            <p:ph type="title"/>
+          </p:nvPr>
+        </p:nvSpPr>
+        <p:spPr>
+          <a:xfrm>
+            <a:off x="223838" y="118733"/>
+            <a:ext cx="6629400" cy="349618"/>
+          </a:xfrm>
+        </p:spPr>
+        <p:txBody>
+          <a:bodyPr/>
+          <a:lstStyle/>
+          <a:p>
+            <a:r>
+              <a:rPr lang="en-US" dirty="0"/>
+              <a:t>*54*</a:t>
+            </a:r>
+          </a:p>
+        </p:txBody>
+      </p:sp>
+      <p:sp>
+        <p:nvSpPr>
+          <p:cNvPr id="4" name="TextBox 3">
+            <a:extLst>
+              <a:ext uri="{FF2B5EF4-FFF2-40B4-BE49-F238E27FC236}">
+                <a16:creationId xmlns:a16="http://schemas.microsoft.com/office/drawing/2014/main" id="{C73B122E-5230-6243-A035-151EDB99E12E}"/>
+              </a:ext>
+            </a:extLst>
+          </p:cNvPr>
+          <p:cNvSpPr txBox="1"/>
+          <p:nvPr/>
+        </p:nvSpPr>
+        <p:spPr>
+          <a:xfrm>
+            <a:off x="223837" y="447345"/>
+            <a:ext cx="6892069" cy="328612"/>
+          </a:xfrm>
+          <a:prstGeom prst="rect">
+            <a:avLst/>
+          </a:prstGeom>
+          <a:noFill/>
+        </p:spPr>
+        <p:txBody>
+          <a:bodyPr wrap="square" lIns="0" tIns="0" rIns="0" bIns="0" rtlCol="0">
+            <a:noAutofit/>
+          </a:bodyPr>
+          <a:lstStyle/>
+          <a:p>
+            <a:r>
+              <a:rPr lang="en-GB" sz="1400" i="1" dirty="0">
+                <a:latin typeface="JLR Emeric SemiBold" panose="02000503040000020004" pitchFamily="2" charset="0"/>
+              </a:rPr>
+              <a:t>State Information</a:t>
+            </a:r>
+          </a:p>
+        </p:txBody>
+      </p:sp>
+    </p:spTree>
+    <p:extLst>
+      <p:ext uri="{BB962C8B-B14F-4D97-AF65-F5344CB8AC3E}">
+        <p14:creationId xmlns:p14="http://schemas.microsoft.com/office/powerpoint/2010/main" val="1715651704"/>
+      </p:ext>
+    </p:extLst>
+  </p:cSld>
+  <p:clrMapOvr>
+    <a:masterClrMapping/>
+  </p:clrMapOvr>
+</p:sld>
+</file>
+
+<file path=ppt/slides/slide56.xml><?xml version="1.0" encoding="utf-8"?>
+<p:sld xmlns:a="http://schemas.openxmlformats.org/drawingml/2006/main" xmlns:r="http://schemas.openxmlformats.org/officeDocument/2006/relationships" xmlns:p="http://schemas.openxmlformats.org/presentationml/2006/main">
+  <p:cSld>
+    <p:spTree>
+      <p:nvGrpSpPr>
+        <p:cNvPr id="1" name=""/>
+        <p:cNvGrpSpPr/>
+        <p:nvPr/>
+      </p:nvGrpSpPr>
+      <p:grpSpPr>
+        <a:xfrm>
+          <a:off x="0" y="0"/>
+          <a:ext cx="0" cy="0"/>
+          <a:chOff x="0" y="0"/>
+          <a:chExt cx="0" cy="0"/>
+        </a:xfrm>
+      </p:grpSpPr>
+      <p:sp>
+        <p:nvSpPr>
+          <p:cNvPr id="2" name="Slide Number Placeholder 1">
+            <a:extLst>
+              <a:ext uri="{FF2B5EF4-FFF2-40B4-BE49-F238E27FC236}">
+                <a16:creationId xmlns:a16="http://schemas.microsoft.com/office/drawing/2014/main" id="{4CF602FA-47FB-1C42-87F9-B1D80E651C85}"/>
+              </a:ext>
+            </a:extLst>
+          </p:cNvPr>
+          <p:cNvSpPr>
+            <a:spLocks noGrp="1"/>
+          </p:cNvSpPr>
+          <p:nvPr>
+            <p:ph type="sldNum" sz="quarter" idx="12"/>
+          </p:nvPr>
+        </p:nvSpPr>
+        <p:spPr/>
+        <p:txBody>
+          <a:bodyPr/>
+          <a:lstStyle/>
+          <a:p>
+            <a:fld id="{C554A706-D19D-4C79-97F9-BC489483F7EF}" type="slidenum">
+              <a:rPr lang="en-GB" smtClean="0"/>
+              <a:t>56</a:t>
+            </a:fld>
+            <a:endParaRPr lang="en-GB" dirty="0"/>
+          </a:p>
+        </p:txBody>
+      </p:sp>
+      <p:sp>
+        <p:nvSpPr>
+          <p:cNvPr id="3" name="Title 2">
+            <a:extLst>
+              <a:ext uri="{FF2B5EF4-FFF2-40B4-BE49-F238E27FC236}">
+                <a16:creationId xmlns:a16="http://schemas.microsoft.com/office/drawing/2014/main" id="{5C8F3E15-B13C-694D-8D0F-CC5DF81C9E0E}"/>
+              </a:ext>
+            </a:extLst>
+          </p:cNvPr>
+          <p:cNvSpPr>
+            <a:spLocks noGrp="1"/>
+          </p:cNvSpPr>
+          <p:nvPr>
+            <p:ph type="title"/>
+          </p:nvPr>
+        </p:nvSpPr>
+        <p:spPr>
+          <a:xfrm>
+            <a:off x="223838" y="118733"/>
+            <a:ext cx="6629400" cy="349618"/>
+          </a:xfrm>
+        </p:spPr>
+        <p:txBody>
+          <a:bodyPr/>
+          <a:lstStyle/>
+          <a:p>
+            <a:r>
+              <a:rPr lang="en-US" dirty="0"/>
+              <a:t>*55*</a:t>
+            </a:r>
+          </a:p>
+        </p:txBody>
+      </p:sp>
+      <p:sp>
+        <p:nvSpPr>
+          <p:cNvPr id="4" name="TextBox 3">
+            <a:extLst>
+              <a:ext uri="{FF2B5EF4-FFF2-40B4-BE49-F238E27FC236}">
+                <a16:creationId xmlns:a16="http://schemas.microsoft.com/office/drawing/2014/main" id="{C73B122E-5230-6243-A035-151EDB99E12E}"/>
+              </a:ext>
+            </a:extLst>
+          </p:cNvPr>
+          <p:cNvSpPr txBox="1"/>
+          <p:nvPr/>
+        </p:nvSpPr>
+        <p:spPr>
+          <a:xfrm>
+            <a:off x="223837" y="447345"/>
+            <a:ext cx="6892069" cy="328612"/>
+          </a:xfrm>
+          <a:prstGeom prst="rect">
+            <a:avLst/>
+          </a:prstGeom>
+          <a:noFill/>
+        </p:spPr>
+        <p:txBody>
+          <a:bodyPr wrap="square" lIns="0" tIns="0" rIns="0" bIns="0" rtlCol="0">
+            <a:noAutofit/>
+          </a:bodyPr>
+          <a:lstStyle/>
+          <a:p>
+            <a:r>
+              <a:rPr lang="en-GB" sz="1400" i="1" dirty="0">
+                <a:latin typeface="JLR Emeric SemiBold" panose="02000503040000020004" pitchFamily="2" charset="0"/>
+              </a:rPr>
+              <a:t>State Information</a:t>
+            </a:r>
+          </a:p>
+        </p:txBody>
+      </p:sp>
+    </p:spTree>
+    <p:extLst>
+      <p:ext uri="{BB962C8B-B14F-4D97-AF65-F5344CB8AC3E}">
+        <p14:creationId xmlns:p14="http://schemas.microsoft.com/office/powerpoint/2010/main" val="1560623001"/>
+      </p:ext>
+    </p:extLst>
+  </p:cSld>
+  <p:clrMapOvr>
+    <a:masterClrMapping/>
+  </p:clrMapOvr>
+</p:sld>
+</file>
+
+<file path=ppt/slides/slide57.xml><?xml version="1.0" encoding="utf-8"?>
+<p:sld xmlns:a="http://schemas.openxmlformats.org/drawingml/2006/main" xmlns:r="http://schemas.openxmlformats.org/officeDocument/2006/relationships" xmlns:p="http://schemas.openxmlformats.org/presentationml/2006/main">
+  <p:cSld>
+    <p:spTree>
+      <p:nvGrpSpPr>
+        <p:cNvPr id="1" name=""/>
+        <p:cNvGrpSpPr/>
+        <p:nvPr/>
+      </p:nvGrpSpPr>
+      <p:grpSpPr>
+        <a:xfrm>
+          <a:off x="0" y="0"/>
+          <a:ext cx="0" cy="0"/>
+          <a:chOff x="0" y="0"/>
+          <a:chExt cx="0" cy="0"/>
+        </a:xfrm>
+      </p:grpSpPr>
+      <p:sp>
+        <p:nvSpPr>
+          <p:cNvPr id="2" name="Slide Number Placeholder 1">
+            <a:extLst>
+              <a:ext uri="{FF2B5EF4-FFF2-40B4-BE49-F238E27FC236}">
+                <a16:creationId xmlns:a16="http://schemas.microsoft.com/office/drawing/2014/main" id="{4CF602FA-47FB-1C42-87F9-B1D80E651C85}"/>
+              </a:ext>
+            </a:extLst>
+          </p:cNvPr>
+          <p:cNvSpPr>
+            <a:spLocks noGrp="1"/>
+          </p:cNvSpPr>
+          <p:nvPr>
+            <p:ph type="sldNum" sz="quarter" idx="12"/>
+          </p:nvPr>
+        </p:nvSpPr>
+        <p:spPr/>
+        <p:txBody>
+          <a:bodyPr/>
+          <a:lstStyle/>
+          <a:p>
+            <a:fld id="{C554A706-D19D-4C79-97F9-BC489483F7EF}" type="slidenum">
+              <a:rPr lang="en-GB" smtClean="0"/>
+              <a:t>57</a:t>
+            </a:fld>
+            <a:endParaRPr lang="en-GB" dirty="0"/>
+          </a:p>
+        </p:txBody>
+      </p:sp>
+      <p:sp>
+        <p:nvSpPr>
+          <p:cNvPr id="3" name="Title 2">
+            <a:extLst>
+              <a:ext uri="{FF2B5EF4-FFF2-40B4-BE49-F238E27FC236}">
+                <a16:creationId xmlns:a16="http://schemas.microsoft.com/office/drawing/2014/main" id="{5C8F3E15-B13C-694D-8D0F-CC5DF81C9E0E}"/>
+              </a:ext>
+            </a:extLst>
+          </p:cNvPr>
+          <p:cNvSpPr>
+            <a:spLocks noGrp="1"/>
+          </p:cNvSpPr>
+          <p:nvPr>
+            <p:ph type="title"/>
+          </p:nvPr>
+        </p:nvSpPr>
+        <p:spPr>
+          <a:xfrm>
+            <a:off x="223838" y="118733"/>
+            <a:ext cx="6629400" cy="349618"/>
+          </a:xfrm>
+        </p:spPr>
+        <p:txBody>
+          <a:bodyPr/>
+          <a:lstStyle/>
+          <a:p>
+            <a:r>
+              <a:rPr lang="en-US" dirty="0"/>
+              <a:t>*56*</a:t>
+            </a:r>
+          </a:p>
+        </p:txBody>
+      </p:sp>
+      <p:sp>
+        <p:nvSpPr>
+          <p:cNvPr id="4" name="TextBox 3">
+            <a:extLst>
+              <a:ext uri="{FF2B5EF4-FFF2-40B4-BE49-F238E27FC236}">
+                <a16:creationId xmlns:a16="http://schemas.microsoft.com/office/drawing/2014/main" id="{C73B122E-5230-6243-A035-151EDB99E12E}"/>
+              </a:ext>
+            </a:extLst>
+          </p:cNvPr>
+          <p:cNvSpPr txBox="1"/>
+          <p:nvPr/>
+        </p:nvSpPr>
+        <p:spPr>
+          <a:xfrm>
+            <a:off x="223837" y="447345"/>
+            <a:ext cx="6892069" cy="328612"/>
+          </a:xfrm>
+          <a:prstGeom prst="rect">
+            <a:avLst/>
+          </a:prstGeom>
+          <a:noFill/>
+        </p:spPr>
+        <p:txBody>
+          <a:bodyPr wrap="square" lIns="0" tIns="0" rIns="0" bIns="0" rtlCol="0">
+            <a:noAutofit/>
+          </a:bodyPr>
+          <a:lstStyle/>
+          <a:p>
+            <a:r>
+              <a:rPr lang="en-GB" sz="1400" i="1" dirty="0">
+                <a:latin typeface="JLR Emeric SemiBold" panose="02000503040000020004" pitchFamily="2" charset="0"/>
+              </a:rPr>
+              <a:t>State Information</a:t>
+            </a:r>
+          </a:p>
+        </p:txBody>
+      </p:sp>
+    </p:spTree>
+    <p:extLst>
+      <p:ext uri="{BB962C8B-B14F-4D97-AF65-F5344CB8AC3E}">
+        <p14:creationId xmlns:p14="http://schemas.microsoft.com/office/powerpoint/2010/main" val="203432153"/>
+      </p:ext>
+    </p:extLst>
+  </p:cSld>
+  <p:clrMapOvr>
+    <a:masterClrMapping/>
+  </p:clrMapOvr>
+</p:sld>
+</file>
+
+<file path=ppt/slides/slide58.xml><?xml version="1.0" encoding="utf-8"?>
+<p:sld xmlns:a="http://schemas.openxmlformats.org/drawingml/2006/main" xmlns:r="http://schemas.openxmlformats.org/officeDocument/2006/relationships" xmlns:p="http://schemas.openxmlformats.org/presentationml/2006/main">
+  <p:cSld>
+    <p:spTree>
+      <p:nvGrpSpPr>
+        <p:cNvPr id="1" name=""/>
+        <p:cNvGrpSpPr/>
+        <p:nvPr/>
+      </p:nvGrpSpPr>
+      <p:grpSpPr>
+        <a:xfrm>
+          <a:off x="0" y="0"/>
+          <a:ext cx="0" cy="0"/>
+          <a:chOff x="0" y="0"/>
+          <a:chExt cx="0" cy="0"/>
+        </a:xfrm>
+      </p:grpSpPr>
+      <p:sp>
+        <p:nvSpPr>
+          <p:cNvPr id="2" name="Slide Number Placeholder 1">
+            <a:extLst>
+              <a:ext uri="{FF2B5EF4-FFF2-40B4-BE49-F238E27FC236}">
+                <a16:creationId xmlns:a16="http://schemas.microsoft.com/office/drawing/2014/main" id="{4CF602FA-47FB-1C42-87F9-B1D80E651C85}"/>
+              </a:ext>
+            </a:extLst>
+          </p:cNvPr>
+          <p:cNvSpPr>
+            <a:spLocks noGrp="1"/>
+          </p:cNvSpPr>
+          <p:nvPr>
+            <p:ph type="sldNum" sz="quarter" idx="12"/>
+          </p:nvPr>
+        </p:nvSpPr>
+        <p:spPr/>
+        <p:txBody>
+          <a:bodyPr/>
+          <a:lstStyle/>
+          <a:p>
+            <a:fld id="{C554A706-D19D-4C79-97F9-BC489483F7EF}" type="slidenum">
+              <a:rPr lang="en-GB" smtClean="0"/>
+              <a:t>58</a:t>
+            </a:fld>
+            <a:endParaRPr lang="en-GB" dirty="0"/>
+          </a:p>
+        </p:txBody>
+      </p:sp>
+      <p:sp>
+        <p:nvSpPr>
+          <p:cNvPr id="3" name="Title 2">
+            <a:extLst>
+              <a:ext uri="{FF2B5EF4-FFF2-40B4-BE49-F238E27FC236}">
+                <a16:creationId xmlns:a16="http://schemas.microsoft.com/office/drawing/2014/main" id="{5C8F3E15-B13C-694D-8D0F-CC5DF81C9E0E}"/>
+              </a:ext>
+            </a:extLst>
+          </p:cNvPr>
+          <p:cNvSpPr>
+            <a:spLocks noGrp="1"/>
+          </p:cNvSpPr>
+          <p:nvPr>
+            <p:ph type="title"/>
+          </p:nvPr>
+        </p:nvSpPr>
+        <p:spPr>
+          <a:xfrm>
+            <a:off x="223838" y="118733"/>
+            <a:ext cx="6629400" cy="349618"/>
+          </a:xfrm>
+        </p:spPr>
+        <p:txBody>
+          <a:bodyPr/>
+          <a:lstStyle/>
+          <a:p>
+            <a:r>
+              <a:rPr lang="en-US" dirty="0"/>
+              <a:t>*57*</a:t>
+            </a:r>
+          </a:p>
+        </p:txBody>
+      </p:sp>
+      <p:sp>
+        <p:nvSpPr>
+          <p:cNvPr id="4" name="TextBox 3">
+            <a:extLst>
+              <a:ext uri="{FF2B5EF4-FFF2-40B4-BE49-F238E27FC236}">
+                <a16:creationId xmlns:a16="http://schemas.microsoft.com/office/drawing/2014/main" id="{C73B122E-5230-6243-A035-151EDB99E12E}"/>
+              </a:ext>
+            </a:extLst>
+          </p:cNvPr>
+          <p:cNvSpPr txBox="1"/>
+          <p:nvPr/>
+        </p:nvSpPr>
+        <p:spPr>
+          <a:xfrm>
+            <a:off x="223837" y="447345"/>
+            <a:ext cx="6892069" cy="328612"/>
+          </a:xfrm>
+          <a:prstGeom prst="rect">
+            <a:avLst/>
+          </a:prstGeom>
+          <a:noFill/>
+        </p:spPr>
+        <p:txBody>
+          <a:bodyPr wrap="square" lIns="0" tIns="0" rIns="0" bIns="0" rtlCol="0">
+            <a:noAutofit/>
+          </a:bodyPr>
+          <a:lstStyle/>
+          <a:p>
+            <a:r>
+              <a:rPr lang="en-GB" sz="1400" i="1" dirty="0">
+                <a:latin typeface="JLR Emeric SemiBold" panose="02000503040000020004" pitchFamily="2" charset="0"/>
+              </a:rPr>
+              <a:t>State Information</a:t>
+            </a:r>
+          </a:p>
+        </p:txBody>
+      </p:sp>
+    </p:spTree>
+    <p:extLst>
+      <p:ext uri="{BB962C8B-B14F-4D97-AF65-F5344CB8AC3E}">
+        <p14:creationId xmlns:p14="http://schemas.microsoft.com/office/powerpoint/2010/main" val="1660778923"/>
+      </p:ext>
+    </p:extLst>
+  </p:cSld>
+  <p:clrMapOvr>
+    <a:masterClrMapping/>
+  </p:clrMapOvr>
+</p:sld>
+</file>
+
+<file path=ppt/slides/slide59.xml><?xml version="1.0" encoding="utf-8"?>
+<p:sld xmlns:a="http://schemas.openxmlformats.org/drawingml/2006/main" xmlns:r="http://schemas.openxmlformats.org/officeDocument/2006/relationships" xmlns:p="http://schemas.openxmlformats.org/presentationml/2006/main">
+  <p:cSld>
+    <p:spTree>
+      <p:nvGrpSpPr>
+        <p:cNvPr id="1" name=""/>
+        <p:cNvGrpSpPr/>
+        <p:nvPr/>
+      </p:nvGrpSpPr>
+      <p:grpSpPr>
+        <a:xfrm>
+          <a:off x="0" y="0"/>
+          <a:ext cx="0" cy="0"/>
+          <a:chOff x="0" y="0"/>
+          <a:chExt cx="0" cy="0"/>
+        </a:xfrm>
+      </p:grpSpPr>
+      <p:sp>
+        <p:nvSpPr>
+          <p:cNvPr id="2" name="Slide Number Placeholder 1">
+            <a:extLst>
+              <a:ext uri="{FF2B5EF4-FFF2-40B4-BE49-F238E27FC236}">
+                <a16:creationId xmlns:a16="http://schemas.microsoft.com/office/drawing/2014/main" id="{4CF602FA-47FB-1C42-87F9-B1D80E651C85}"/>
+              </a:ext>
+            </a:extLst>
+          </p:cNvPr>
+          <p:cNvSpPr>
+            <a:spLocks noGrp="1"/>
+          </p:cNvSpPr>
+          <p:nvPr>
+            <p:ph type="sldNum" sz="quarter" idx="12"/>
+          </p:nvPr>
+        </p:nvSpPr>
+        <p:spPr/>
+        <p:txBody>
+          <a:bodyPr/>
+          <a:lstStyle/>
+          <a:p>
+            <a:fld id="{C554A706-D19D-4C79-97F9-BC489483F7EF}" type="slidenum">
+              <a:rPr lang="en-GB" smtClean="0"/>
+              <a:t>59</a:t>
+            </a:fld>
+            <a:endParaRPr lang="en-GB" dirty="0"/>
+          </a:p>
+        </p:txBody>
+      </p:sp>
+      <p:sp>
+        <p:nvSpPr>
+          <p:cNvPr id="3" name="Title 2">
+            <a:extLst>
+              <a:ext uri="{FF2B5EF4-FFF2-40B4-BE49-F238E27FC236}">
+                <a16:creationId xmlns:a16="http://schemas.microsoft.com/office/drawing/2014/main" id="{5C8F3E15-B13C-694D-8D0F-CC5DF81C9E0E}"/>
+              </a:ext>
+            </a:extLst>
+          </p:cNvPr>
+          <p:cNvSpPr>
+            <a:spLocks noGrp="1"/>
+          </p:cNvSpPr>
+          <p:nvPr>
+            <p:ph type="title"/>
+          </p:nvPr>
+        </p:nvSpPr>
+        <p:spPr>
+          <a:xfrm>
+            <a:off x="223838" y="118733"/>
+            <a:ext cx="6629400" cy="349618"/>
+          </a:xfrm>
+        </p:spPr>
+        <p:txBody>
+          <a:bodyPr/>
+          <a:lstStyle/>
+          <a:p>
+            <a:r>
+              <a:rPr lang="en-US" dirty="0"/>
+              <a:t>*58*</a:t>
+            </a:r>
+          </a:p>
+        </p:txBody>
+      </p:sp>
+      <p:sp>
+        <p:nvSpPr>
+          <p:cNvPr id="4" name="TextBox 3">
+            <a:extLst>
+              <a:ext uri="{FF2B5EF4-FFF2-40B4-BE49-F238E27FC236}">
+                <a16:creationId xmlns:a16="http://schemas.microsoft.com/office/drawing/2014/main" id="{C73B122E-5230-6243-A035-151EDB99E12E}"/>
+              </a:ext>
+            </a:extLst>
+          </p:cNvPr>
+          <p:cNvSpPr txBox="1"/>
+          <p:nvPr/>
+        </p:nvSpPr>
+        <p:spPr>
+          <a:xfrm>
+            <a:off x="223837" y="447345"/>
+            <a:ext cx="6892069" cy="328612"/>
+          </a:xfrm>
+          <a:prstGeom prst="rect">
+            <a:avLst/>
+          </a:prstGeom>
+          <a:noFill/>
+        </p:spPr>
+        <p:txBody>
+          <a:bodyPr wrap="square" lIns="0" tIns="0" rIns="0" bIns="0" rtlCol="0">
+            <a:noAutofit/>
+          </a:bodyPr>
+          <a:lstStyle/>
+          <a:p>
+            <a:r>
+              <a:rPr lang="en-GB" sz="1400" i="1" dirty="0">
+                <a:latin typeface="JLR Emeric SemiBold" panose="02000503040000020004" pitchFamily="2" charset="0"/>
+              </a:rPr>
+              <a:t>State Information</a:t>
+            </a:r>
+          </a:p>
+        </p:txBody>
+      </p:sp>
+    </p:spTree>
+    <p:extLst>
+      <p:ext uri="{BB962C8B-B14F-4D97-AF65-F5344CB8AC3E}">
+        <p14:creationId xmlns:p14="http://schemas.microsoft.com/office/powerpoint/2010/main" val="3818375274"/>
       </p:ext>
     </p:extLst>
   </p:cSld>
@@ -10212,6 +11305,1296 @@
 </p:sld>
 </file>
 
+<file path=ppt/slides/slide60.xml><?xml version="1.0" encoding="utf-8"?>
+<p:sld xmlns:a="http://schemas.openxmlformats.org/drawingml/2006/main" xmlns:r="http://schemas.openxmlformats.org/officeDocument/2006/relationships" xmlns:p="http://schemas.openxmlformats.org/presentationml/2006/main">
+  <p:cSld>
+    <p:spTree>
+      <p:nvGrpSpPr>
+        <p:cNvPr id="1" name=""/>
+        <p:cNvGrpSpPr/>
+        <p:nvPr/>
+      </p:nvGrpSpPr>
+      <p:grpSpPr>
+        <a:xfrm>
+          <a:off x="0" y="0"/>
+          <a:ext cx="0" cy="0"/>
+          <a:chOff x="0" y="0"/>
+          <a:chExt cx="0" cy="0"/>
+        </a:xfrm>
+      </p:grpSpPr>
+      <p:sp>
+        <p:nvSpPr>
+          <p:cNvPr id="2" name="Slide Number Placeholder 1">
+            <a:extLst>
+              <a:ext uri="{FF2B5EF4-FFF2-40B4-BE49-F238E27FC236}">
+                <a16:creationId xmlns:a16="http://schemas.microsoft.com/office/drawing/2014/main" id="{4CF602FA-47FB-1C42-87F9-B1D80E651C85}"/>
+              </a:ext>
+            </a:extLst>
+          </p:cNvPr>
+          <p:cNvSpPr>
+            <a:spLocks noGrp="1"/>
+          </p:cNvSpPr>
+          <p:nvPr>
+            <p:ph type="sldNum" sz="quarter" idx="12"/>
+          </p:nvPr>
+        </p:nvSpPr>
+        <p:spPr/>
+        <p:txBody>
+          <a:bodyPr/>
+          <a:lstStyle/>
+          <a:p>
+            <a:fld id="{C554A706-D19D-4C79-97F9-BC489483F7EF}" type="slidenum">
+              <a:rPr lang="en-GB" smtClean="0"/>
+              <a:t>60</a:t>
+            </a:fld>
+            <a:endParaRPr lang="en-GB" dirty="0"/>
+          </a:p>
+        </p:txBody>
+      </p:sp>
+      <p:sp>
+        <p:nvSpPr>
+          <p:cNvPr id="3" name="Title 2">
+            <a:extLst>
+              <a:ext uri="{FF2B5EF4-FFF2-40B4-BE49-F238E27FC236}">
+                <a16:creationId xmlns:a16="http://schemas.microsoft.com/office/drawing/2014/main" id="{5C8F3E15-B13C-694D-8D0F-CC5DF81C9E0E}"/>
+              </a:ext>
+            </a:extLst>
+          </p:cNvPr>
+          <p:cNvSpPr>
+            <a:spLocks noGrp="1"/>
+          </p:cNvSpPr>
+          <p:nvPr>
+            <p:ph type="title"/>
+          </p:nvPr>
+        </p:nvSpPr>
+        <p:spPr>
+          <a:xfrm>
+            <a:off x="223838" y="118733"/>
+            <a:ext cx="6629400" cy="349618"/>
+          </a:xfrm>
+        </p:spPr>
+        <p:txBody>
+          <a:bodyPr/>
+          <a:lstStyle/>
+          <a:p>
+            <a:r>
+              <a:rPr lang="en-US" dirty="0"/>
+              <a:t>*59*</a:t>
+            </a:r>
+          </a:p>
+        </p:txBody>
+      </p:sp>
+      <p:sp>
+        <p:nvSpPr>
+          <p:cNvPr id="4" name="TextBox 3">
+            <a:extLst>
+              <a:ext uri="{FF2B5EF4-FFF2-40B4-BE49-F238E27FC236}">
+                <a16:creationId xmlns:a16="http://schemas.microsoft.com/office/drawing/2014/main" id="{C73B122E-5230-6243-A035-151EDB99E12E}"/>
+              </a:ext>
+            </a:extLst>
+          </p:cNvPr>
+          <p:cNvSpPr txBox="1"/>
+          <p:nvPr/>
+        </p:nvSpPr>
+        <p:spPr>
+          <a:xfrm>
+            <a:off x="223837" y="447345"/>
+            <a:ext cx="6892069" cy="328612"/>
+          </a:xfrm>
+          <a:prstGeom prst="rect">
+            <a:avLst/>
+          </a:prstGeom>
+          <a:noFill/>
+        </p:spPr>
+        <p:txBody>
+          <a:bodyPr wrap="square" lIns="0" tIns="0" rIns="0" bIns="0" rtlCol="0">
+            <a:noAutofit/>
+          </a:bodyPr>
+          <a:lstStyle/>
+          <a:p>
+            <a:r>
+              <a:rPr lang="en-GB" sz="1400" i="1" dirty="0">
+                <a:latin typeface="JLR Emeric SemiBold" panose="02000503040000020004" pitchFamily="2" charset="0"/>
+              </a:rPr>
+              <a:t>State Information</a:t>
+            </a:r>
+          </a:p>
+        </p:txBody>
+      </p:sp>
+    </p:spTree>
+    <p:extLst>
+      <p:ext uri="{BB962C8B-B14F-4D97-AF65-F5344CB8AC3E}">
+        <p14:creationId xmlns:p14="http://schemas.microsoft.com/office/powerpoint/2010/main" val="3250228033"/>
+      </p:ext>
+    </p:extLst>
+  </p:cSld>
+  <p:clrMapOvr>
+    <a:masterClrMapping/>
+  </p:clrMapOvr>
+</p:sld>
+</file>
+
+<file path=ppt/slides/slide61.xml><?xml version="1.0" encoding="utf-8"?>
+<p:sld xmlns:a="http://schemas.openxmlformats.org/drawingml/2006/main" xmlns:r="http://schemas.openxmlformats.org/officeDocument/2006/relationships" xmlns:p="http://schemas.openxmlformats.org/presentationml/2006/main">
+  <p:cSld>
+    <p:spTree>
+      <p:nvGrpSpPr>
+        <p:cNvPr id="1" name=""/>
+        <p:cNvGrpSpPr/>
+        <p:nvPr/>
+      </p:nvGrpSpPr>
+      <p:grpSpPr>
+        <a:xfrm>
+          <a:off x="0" y="0"/>
+          <a:ext cx="0" cy="0"/>
+          <a:chOff x="0" y="0"/>
+          <a:chExt cx="0" cy="0"/>
+        </a:xfrm>
+      </p:grpSpPr>
+      <p:sp>
+        <p:nvSpPr>
+          <p:cNvPr id="2" name="Slide Number Placeholder 1">
+            <a:extLst>
+              <a:ext uri="{FF2B5EF4-FFF2-40B4-BE49-F238E27FC236}">
+                <a16:creationId xmlns:a16="http://schemas.microsoft.com/office/drawing/2014/main" id="{4CF602FA-47FB-1C42-87F9-B1D80E651C85}"/>
+              </a:ext>
+            </a:extLst>
+          </p:cNvPr>
+          <p:cNvSpPr>
+            <a:spLocks noGrp="1"/>
+          </p:cNvSpPr>
+          <p:nvPr>
+            <p:ph type="sldNum" sz="quarter" idx="12"/>
+          </p:nvPr>
+        </p:nvSpPr>
+        <p:spPr/>
+        <p:txBody>
+          <a:bodyPr/>
+          <a:lstStyle/>
+          <a:p>
+            <a:fld id="{C554A706-D19D-4C79-97F9-BC489483F7EF}" type="slidenum">
+              <a:rPr lang="en-GB" smtClean="0"/>
+              <a:t>61</a:t>
+            </a:fld>
+            <a:endParaRPr lang="en-GB" dirty="0"/>
+          </a:p>
+        </p:txBody>
+      </p:sp>
+      <p:sp>
+        <p:nvSpPr>
+          <p:cNvPr id="3" name="Title 2">
+            <a:extLst>
+              <a:ext uri="{FF2B5EF4-FFF2-40B4-BE49-F238E27FC236}">
+                <a16:creationId xmlns:a16="http://schemas.microsoft.com/office/drawing/2014/main" id="{5C8F3E15-B13C-694D-8D0F-CC5DF81C9E0E}"/>
+              </a:ext>
+            </a:extLst>
+          </p:cNvPr>
+          <p:cNvSpPr>
+            <a:spLocks noGrp="1"/>
+          </p:cNvSpPr>
+          <p:nvPr>
+            <p:ph type="title"/>
+          </p:nvPr>
+        </p:nvSpPr>
+        <p:spPr>
+          <a:xfrm>
+            <a:off x="223838" y="118733"/>
+            <a:ext cx="6629400" cy="349618"/>
+          </a:xfrm>
+        </p:spPr>
+        <p:txBody>
+          <a:bodyPr/>
+          <a:lstStyle/>
+          <a:p>
+            <a:r>
+              <a:rPr lang="en-US" dirty="0"/>
+              <a:t>*60*</a:t>
+            </a:r>
+          </a:p>
+        </p:txBody>
+      </p:sp>
+      <p:sp>
+        <p:nvSpPr>
+          <p:cNvPr id="4" name="TextBox 3">
+            <a:extLst>
+              <a:ext uri="{FF2B5EF4-FFF2-40B4-BE49-F238E27FC236}">
+                <a16:creationId xmlns:a16="http://schemas.microsoft.com/office/drawing/2014/main" id="{C73B122E-5230-6243-A035-151EDB99E12E}"/>
+              </a:ext>
+            </a:extLst>
+          </p:cNvPr>
+          <p:cNvSpPr txBox="1"/>
+          <p:nvPr/>
+        </p:nvSpPr>
+        <p:spPr>
+          <a:xfrm>
+            <a:off x="223837" y="447345"/>
+            <a:ext cx="6892069" cy="328612"/>
+          </a:xfrm>
+          <a:prstGeom prst="rect">
+            <a:avLst/>
+          </a:prstGeom>
+          <a:noFill/>
+        </p:spPr>
+        <p:txBody>
+          <a:bodyPr wrap="square" lIns="0" tIns="0" rIns="0" bIns="0" rtlCol="0">
+            <a:noAutofit/>
+          </a:bodyPr>
+          <a:lstStyle/>
+          <a:p>
+            <a:r>
+              <a:rPr lang="en-GB" sz="1400" i="1" dirty="0">
+                <a:latin typeface="JLR Emeric SemiBold" panose="02000503040000020004" pitchFamily="2" charset="0"/>
+              </a:rPr>
+              <a:t>State Information</a:t>
+            </a:r>
+          </a:p>
+        </p:txBody>
+      </p:sp>
+    </p:spTree>
+    <p:extLst>
+      <p:ext uri="{BB962C8B-B14F-4D97-AF65-F5344CB8AC3E}">
+        <p14:creationId xmlns:p14="http://schemas.microsoft.com/office/powerpoint/2010/main" val="42110064"/>
+      </p:ext>
+    </p:extLst>
+  </p:cSld>
+  <p:clrMapOvr>
+    <a:masterClrMapping/>
+  </p:clrMapOvr>
+</p:sld>
+</file>
+
+<file path=ppt/slides/slide62.xml><?xml version="1.0" encoding="utf-8"?>
+<p:sld xmlns:a="http://schemas.openxmlformats.org/drawingml/2006/main" xmlns:r="http://schemas.openxmlformats.org/officeDocument/2006/relationships" xmlns:p="http://schemas.openxmlformats.org/presentationml/2006/main">
+  <p:cSld>
+    <p:spTree>
+      <p:nvGrpSpPr>
+        <p:cNvPr id="1" name=""/>
+        <p:cNvGrpSpPr/>
+        <p:nvPr/>
+      </p:nvGrpSpPr>
+      <p:grpSpPr>
+        <a:xfrm>
+          <a:off x="0" y="0"/>
+          <a:ext cx="0" cy="0"/>
+          <a:chOff x="0" y="0"/>
+          <a:chExt cx="0" cy="0"/>
+        </a:xfrm>
+      </p:grpSpPr>
+      <p:sp>
+        <p:nvSpPr>
+          <p:cNvPr id="2" name="Slide Number Placeholder 1">
+            <a:extLst>
+              <a:ext uri="{FF2B5EF4-FFF2-40B4-BE49-F238E27FC236}">
+                <a16:creationId xmlns:a16="http://schemas.microsoft.com/office/drawing/2014/main" id="{4CF602FA-47FB-1C42-87F9-B1D80E651C85}"/>
+              </a:ext>
+            </a:extLst>
+          </p:cNvPr>
+          <p:cNvSpPr>
+            <a:spLocks noGrp="1"/>
+          </p:cNvSpPr>
+          <p:nvPr>
+            <p:ph type="sldNum" sz="quarter" idx="12"/>
+          </p:nvPr>
+        </p:nvSpPr>
+        <p:spPr/>
+        <p:txBody>
+          <a:bodyPr/>
+          <a:lstStyle/>
+          <a:p>
+            <a:fld id="{C554A706-D19D-4C79-97F9-BC489483F7EF}" type="slidenum">
+              <a:rPr lang="en-GB" smtClean="0"/>
+              <a:t>62</a:t>
+            </a:fld>
+            <a:endParaRPr lang="en-GB" dirty="0"/>
+          </a:p>
+        </p:txBody>
+      </p:sp>
+      <p:sp>
+        <p:nvSpPr>
+          <p:cNvPr id="3" name="Title 2">
+            <a:extLst>
+              <a:ext uri="{FF2B5EF4-FFF2-40B4-BE49-F238E27FC236}">
+                <a16:creationId xmlns:a16="http://schemas.microsoft.com/office/drawing/2014/main" id="{5C8F3E15-B13C-694D-8D0F-CC5DF81C9E0E}"/>
+              </a:ext>
+            </a:extLst>
+          </p:cNvPr>
+          <p:cNvSpPr>
+            <a:spLocks noGrp="1"/>
+          </p:cNvSpPr>
+          <p:nvPr>
+            <p:ph type="title"/>
+          </p:nvPr>
+        </p:nvSpPr>
+        <p:spPr>
+          <a:xfrm>
+            <a:off x="223838" y="118733"/>
+            <a:ext cx="6629400" cy="349618"/>
+          </a:xfrm>
+        </p:spPr>
+        <p:txBody>
+          <a:bodyPr/>
+          <a:lstStyle/>
+          <a:p>
+            <a:r>
+              <a:rPr lang="en-US" dirty="0"/>
+              <a:t>*61*</a:t>
+            </a:r>
+          </a:p>
+        </p:txBody>
+      </p:sp>
+      <p:sp>
+        <p:nvSpPr>
+          <p:cNvPr id="4" name="TextBox 3">
+            <a:extLst>
+              <a:ext uri="{FF2B5EF4-FFF2-40B4-BE49-F238E27FC236}">
+                <a16:creationId xmlns:a16="http://schemas.microsoft.com/office/drawing/2014/main" id="{C73B122E-5230-6243-A035-151EDB99E12E}"/>
+              </a:ext>
+            </a:extLst>
+          </p:cNvPr>
+          <p:cNvSpPr txBox="1"/>
+          <p:nvPr/>
+        </p:nvSpPr>
+        <p:spPr>
+          <a:xfrm>
+            <a:off x="223837" y="447345"/>
+            <a:ext cx="6892069" cy="328612"/>
+          </a:xfrm>
+          <a:prstGeom prst="rect">
+            <a:avLst/>
+          </a:prstGeom>
+          <a:noFill/>
+        </p:spPr>
+        <p:txBody>
+          <a:bodyPr wrap="square" lIns="0" tIns="0" rIns="0" bIns="0" rtlCol="0">
+            <a:noAutofit/>
+          </a:bodyPr>
+          <a:lstStyle/>
+          <a:p>
+            <a:r>
+              <a:rPr lang="en-GB" sz="1400" i="1" dirty="0">
+                <a:latin typeface="JLR Emeric SemiBold" panose="02000503040000020004" pitchFamily="2" charset="0"/>
+              </a:rPr>
+              <a:t>State Information</a:t>
+            </a:r>
+          </a:p>
+        </p:txBody>
+      </p:sp>
+    </p:spTree>
+    <p:extLst>
+      <p:ext uri="{BB962C8B-B14F-4D97-AF65-F5344CB8AC3E}">
+        <p14:creationId xmlns:p14="http://schemas.microsoft.com/office/powerpoint/2010/main" val="1918148922"/>
+      </p:ext>
+    </p:extLst>
+  </p:cSld>
+  <p:clrMapOvr>
+    <a:masterClrMapping/>
+  </p:clrMapOvr>
+</p:sld>
+</file>
+
+<file path=ppt/slides/slide63.xml><?xml version="1.0" encoding="utf-8"?>
+<p:sld xmlns:a="http://schemas.openxmlformats.org/drawingml/2006/main" xmlns:r="http://schemas.openxmlformats.org/officeDocument/2006/relationships" xmlns:p="http://schemas.openxmlformats.org/presentationml/2006/main">
+  <p:cSld>
+    <p:spTree>
+      <p:nvGrpSpPr>
+        <p:cNvPr id="1" name=""/>
+        <p:cNvGrpSpPr/>
+        <p:nvPr/>
+      </p:nvGrpSpPr>
+      <p:grpSpPr>
+        <a:xfrm>
+          <a:off x="0" y="0"/>
+          <a:ext cx="0" cy="0"/>
+          <a:chOff x="0" y="0"/>
+          <a:chExt cx="0" cy="0"/>
+        </a:xfrm>
+      </p:grpSpPr>
+      <p:sp>
+        <p:nvSpPr>
+          <p:cNvPr id="2" name="Slide Number Placeholder 1">
+            <a:extLst>
+              <a:ext uri="{FF2B5EF4-FFF2-40B4-BE49-F238E27FC236}">
+                <a16:creationId xmlns:a16="http://schemas.microsoft.com/office/drawing/2014/main" id="{4CF602FA-47FB-1C42-87F9-B1D80E651C85}"/>
+              </a:ext>
+            </a:extLst>
+          </p:cNvPr>
+          <p:cNvSpPr>
+            <a:spLocks noGrp="1"/>
+          </p:cNvSpPr>
+          <p:nvPr>
+            <p:ph type="sldNum" sz="quarter" idx="12"/>
+          </p:nvPr>
+        </p:nvSpPr>
+        <p:spPr/>
+        <p:txBody>
+          <a:bodyPr/>
+          <a:lstStyle/>
+          <a:p>
+            <a:fld id="{C554A706-D19D-4C79-97F9-BC489483F7EF}" type="slidenum">
+              <a:rPr lang="en-GB" smtClean="0"/>
+              <a:t>63</a:t>
+            </a:fld>
+            <a:endParaRPr lang="en-GB" dirty="0"/>
+          </a:p>
+        </p:txBody>
+      </p:sp>
+      <p:sp>
+        <p:nvSpPr>
+          <p:cNvPr id="3" name="Title 2">
+            <a:extLst>
+              <a:ext uri="{FF2B5EF4-FFF2-40B4-BE49-F238E27FC236}">
+                <a16:creationId xmlns:a16="http://schemas.microsoft.com/office/drawing/2014/main" id="{5C8F3E15-B13C-694D-8D0F-CC5DF81C9E0E}"/>
+              </a:ext>
+            </a:extLst>
+          </p:cNvPr>
+          <p:cNvSpPr>
+            <a:spLocks noGrp="1"/>
+          </p:cNvSpPr>
+          <p:nvPr>
+            <p:ph type="title"/>
+          </p:nvPr>
+        </p:nvSpPr>
+        <p:spPr>
+          <a:xfrm>
+            <a:off x="223838" y="118733"/>
+            <a:ext cx="6629400" cy="349618"/>
+          </a:xfrm>
+        </p:spPr>
+        <p:txBody>
+          <a:bodyPr/>
+          <a:lstStyle/>
+          <a:p>
+            <a:r>
+              <a:rPr lang="en-US" dirty="0"/>
+              <a:t>*62*</a:t>
+            </a:r>
+          </a:p>
+        </p:txBody>
+      </p:sp>
+      <p:sp>
+        <p:nvSpPr>
+          <p:cNvPr id="4" name="TextBox 3">
+            <a:extLst>
+              <a:ext uri="{FF2B5EF4-FFF2-40B4-BE49-F238E27FC236}">
+                <a16:creationId xmlns:a16="http://schemas.microsoft.com/office/drawing/2014/main" id="{C73B122E-5230-6243-A035-151EDB99E12E}"/>
+              </a:ext>
+            </a:extLst>
+          </p:cNvPr>
+          <p:cNvSpPr txBox="1"/>
+          <p:nvPr/>
+        </p:nvSpPr>
+        <p:spPr>
+          <a:xfrm>
+            <a:off x="223837" y="447345"/>
+            <a:ext cx="6892069" cy="328612"/>
+          </a:xfrm>
+          <a:prstGeom prst="rect">
+            <a:avLst/>
+          </a:prstGeom>
+          <a:noFill/>
+        </p:spPr>
+        <p:txBody>
+          <a:bodyPr wrap="square" lIns="0" tIns="0" rIns="0" bIns="0" rtlCol="0">
+            <a:noAutofit/>
+          </a:bodyPr>
+          <a:lstStyle/>
+          <a:p>
+            <a:r>
+              <a:rPr lang="en-GB" sz="1400" i="1" dirty="0">
+                <a:latin typeface="JLR Emeric SemiBold" panose="02000503040000020004" pitchFamily="2" charset="0"/>
+              </a:rPr>
+              <a:t>State Information</a:t>
+            </a:r>
+          </a:p>
+        </p:txBody>
+      </p:sp>
+    </p:spTree>
+    <p:extLst>
+      <p:ext uri="{BB962C8B-B14F-4D97-AF65-F5344CB8AC3E}">
+        <p14:creationId xmlns:p14="http://schemas.microsoft.com/office/powerpoint/2010/main" val="1701641870"/>
+      </p:ext>
+    </p:extLst>
+  </p:cSld>
+  <p:clrMapOvr>
+    <a:masterClrMapping/>
+  </p:clrMapOvr>
+</p:sld>
+</file>
+
+<file path=ppt/slides/slide64.xml><?xml version="1.0" encoding="utf-8"?>
+<p:sld xmlns:a="http://schemas.openxmlformats.org/drawingml/2006/main" xmlns:r="http://schemas.openxmlformats.org/officeDocument/2006/relationships" xmlns:p="http://schemas.openxmlformats.org/presentationml/2006/main">
+  <p:cSld>
+    <p:spTree>
+      <p:nvGrpSpPr>
+        <p:cNvPr id="1" name=""/>
+        <p:cNvGrpSpPr/>
+        <p:nvPr/>
+      </p:nvGrpSpPr>
+      <p:grpSpPr>
+        <a:xfrm>
+          <a:off x="0" y="0"/>
+          <a:ext cx="0" cy="0"/>
+          <a:chOff x="0" y="0"/>
+          <a:chExt cx="0" cy="0"/>
+        </a:xfrm>
+      </p:grpSpPr>
+      <p:sp>
+        <p:nvSpPr>
+          <p:cNvPr id="2" name="Slide Number Placeholder 1">
+            <a:extLst>
+              <a:ext uri="{FF2B5EF4-FFF2-40B4-BE49-F238E27FC236}">
+                <a16:creationId xmlns:a16="http://schemas.microsoft.com/office/drawing/2014/main" id="{4CF602FA-47FB-1C42-87F9-B1D80E651C85}"/>
+              </a:ext>
+            </a:extLst>
+          </p:cNvPr>
+          <p:cNvSpPr>
+            <a:spLocks noGrp="1"/>
+          </p:cNvSpPr>
+          <p:nvPr>
+            <p:ph type="sldNum" sz="quarter" idx="12"/>
+          </p:nvPr>
+        </p:nvSpPr>
+        <p:spPr/>
+        <p:txBody>
+          <a:bodyPr/>
+          <a:lstStyle/>
+          <a:p>
+            <a:fld id="{C554A706-D19D-4C79-97F9-BC489483F7EF}" type="slidenum">
+              <a:rPr lang="en-GB" smtClean="0"/>
+              <a:t>64</a:t>
+            </a:fld>
+            <a:endParaRPr lang="en-GB" dirty="0"/>
+          </a:p>
+        </p:txBody>
+      </p:sp>
+      <p:sp>
+        <p:nvSpPr>
+          <p:cNvPr id="3" name="Title 2">
+            <a:extLst>
+              <a:ext uri="{FF2B5EF4-FFF2-40B4-BE49-F238E27FC236}">
+                <a16:creationId xmlns:a16="http://schemas.microsoft.com/office/drawing/2014/main" id="{5C8F3E15-B13C-694D-8D0F-CC5DF81C9E0E}"/>
+              </a:ext>
+            </a:extLst>
+          </p:cNvPr>
+          <p:cNvSpPr>
+            <a:spLocks noGrp="1"/>
+          </p:cNvSpPr>
+          <p:nvPr>
+            <p:ph type="title"/>
+          </p:nvPr>
+        </p:nvSpPr>
+        <p:spPr>
+          <a:xfrm>
+            <a:off x="223838" y="118733"/>
+            <a:ext cx="6629400" cy="349618"/>
+          </a:xfrm>
+        </p:spPr>
+        <p:txBody>
+          <a:bodyPr/>
+          <a:lstStyle/>
+          <a:p>
+            <a:r>
+              <a:rPr lang="en-US" dirty="0"/>
+              <a:t>*63*</a:t>
+            </a:r>
+          </a:p>
+        </p:txBody>
+      </p:sp>
+      <p:sp>
+        <p:nvSpPr>
+          <p:cNvPr id="4" name="TextBox 3">
+            <a:extLst>
+              <a:ext uri="{FF2B5EF4-FFF2-40B4-BE49-F238E27FC236}">
+                <a16:creationId xmlns:a16="http://schemas.microsoft.com/office/drawing/2014/main" id="{C73B122E-5230-6243-A035-151EDB99E12E}"/>
+              </a:ext>
+            </a:extLst>
+          </p:cNvPr>
+          <p:cNvSpPr txBox="1"/>
+          <p:nvPr/>
+        </p:nvSpPr>
+        <p:spPr>
+          <a:xfrm>
+            <a:off x="223837" y="447345"/>
+            <a:ext cx="6892069" cy="328612"/>
+          </a:xfrm>
+          <a:prstGeom prst="rect">
+            <a:avLst/>
+          </a:prstGeom>
+          <a:noFill/>
+        </p:spPr>
+        <p:txBody>
+          <a:bodyPr wrap="square" lIns="0" tIns="0" rIns="0" bIns="0" rtlCol="0">
+            <a:noAutofit/>
+          </a:bodyPr>
+          <a:lstStyle/>
+          <a:p>
+            <a:r>
+              <a:rPr lang="en-GB" sz="1400" i="1" dirty="0">
+                <a:latin typeface="JLR Emeric SemiBold" panose="02000503040000020004" pitchFamily="2" charset="0"/>
+              </a:rPr>
+              <a:t>State Information</a:t>
+            </a:r>
+          </a:p>
+        </p:txBody>
+      </p:sp>
+    </p:spTree>
+    <p:extLst>
+      <p:ext uri="{BB962C8B-B14F-4D97-AF65-F5344CB8AC3E}">
+        <p14:creationId xmlns:p14="http://schemas.microsoft.com/office/powerpoint/2010/main" val="3234657146"/>
+      </p:ext>
+    </p:extLst>
+  </p:cSld>
+  <p:clrMapOvr>
+    <a:masterClrMapping/>
+  </p:clrMapOvr>
+</p:sld>
+</file>
+
+<file path=ppt/slides/slide65.xml><?xml version="1.0" encoding="utf-8"?>
+<p:sld xmlns:a="http://schemas.openxmlformats.org/drawingml/2006/main" xmlns:r="http://schemas.openxmlformats.org/officeDocument/2006/relationships" xmlns:p="http://schemas.openxmlformats.org/presentationml/2006/main">
+  <p:cSld>
+    <p:spTree>
+      <p:nvGrpSpPr>
+        <p:cNvPr id="1" name=""/>
+        <p:cNvGrpSpPr/>
+        <p:nvPr/>
+      </p:nvGrpSpPr>
+      <p:grpSpPr>
+        <a:xfrm>
+          <a:off x="0" y="0"/>
+          <a:ext cx="0" cy="0"/>
+          <a:chOff x="0" y="0"/>
+          <a:chExt cx="0" cy="0"/>
+        </a:xfrm>
+      </p:grpSpPr>
+      <p:sp>
+        <p:nvSpPr>
+          <p:cNvPr id="2" name="Slide Number Placeholder 1">
+            <a:extLst>
+              <a:ext uri="{FF2B5EF4-FFF2-40B4-BE49-F238E27FC236}">
+                <a16:creationId xmlns:a16="http://schemas.microsoft.com/office/drawing/2014/main" id="{4CF602FA-47FB-1C42-87F9-B1D80E651C85}"/>
+              </a:ext>
+            </a:extLst>
+          </p:cNvPr>
+          <p:cNvSpPr>
+            <a:spLocks noGrp="1"/>
+          </p:cNvSpPr>
+          <p:nvPr>
+            <p:ph type="sldNum" sz="quarter" idx="12"/>
+          </p:nvPr>
+        </p:nvSpPr>
+        <p:spPr/>
+        <p:txBody>
+          <a:bodyPr/>
+          <a:lstStyle/>
+          <a:p>
+            <a:fld id="{C554A706-D19D-4C79-97F9-BC489483F7EF}" type="slidenum">
+              <a:rPr lang="en-GB" smtClean="0"/>
+              <a:t>65</a:t>
+            </a:fld>
+            <a:endParaRPr lang="en-GB" dirty="0"/>
+          </a:p>
+        </p:txBody>
+      </p:sp>
+      <p:sp>
+        <p:nvSpPr>
+          <p:cNvPr id="3" name="Title 2">
+            <a:extLst>
+              <a:ext uri="{FF2B5EF4-FFF2-40B4-BE49-F238E27FC236}">
+                <a16:creationId xmlns:a16="http://schemas.microsoft.com/office/drawing/2014/main" id="{5C8F3E15-B13C-694D-8D0F-CC5DF81C9E0E}"/>
+              </a:ext>
+            </a:extLst>
+          </p:cNvPr>
+          <p:cNvSpPr>
+            <a:spLocks noGrp="1"/>
+          </p:cNvSpPr>
+          <p:nvPr>
+            <p:ph type="title"/>
+          </p:nvPr>
+        </p:nvSpPr>
+        <p:spPr>
+          <a:xfrm>
+            <a:off x="223838" y="118733"/>
+            <a:ext cx="6629400" cy="349618"/>
+          </a:xfrm>
+        </p:spPr>
+        <p:txBody>
+          <a:bodyPr/>
+          <a:lstStyle/>
+          <a:p>
+            <a:r>
+              <a:rPr lang="en-US" dirty="0"/>
+              <a:t>*64*</a:t>
+            </a:r>
+          </a:p>
+        </p:txBody>
+      </p:sp>
+      <p:sp>
+        <p:nvSpPr>
+          <p:cNvPr id="4" name="TextBox 3">
+            <a:extLst>
+              <a:ext uri="{FF2B5EF4-FFF2-40B4-BE49-F238E27FC236}">
+                <a16:creationId xmlns:a16="http://schemas.microsoft.com/office/drawing/2014/main" id="{C73B122E-5230-6243-A035-151EDB99E12E}"/>
+              </a:ext>
+            </a:extLst>
+          </p:cNvPr>
+          <p:cNvSpPr txBox="1"/>
+          <p:nvPr/>
+        </p:nvSpPr>
+        <p:spPr>
+          <a:xfrm>
+            <a:off x="223837" y="447345"/>
+            <a:ext cx="6892069" cy="328612"/>
+          </a:xfrm>
+          <a:prstGeom prst="rect">
+            <a:avLst/>
+          </a:prstGeom>
+          <a:noFill/>
+        </p:spPr>
+        <p:txBody>
+          <a:bodyPr wrap="square" lIns="0" tIns="0" rIns="0" bIns="0" rtlCol="0">
+            <a:noAutofit/>
+          </a:bodyPr>
+          <a:lstStyle/>
+          <a:p>
+            <a:r>
+              <a:rPr lang="en-GB" sz="1400" i="1" dirty="0">
+                <a:latin typeface="JLR Emeric SemiBold" panose="02000503040000020004" pitchFamily="2" charset="0"/>
+              </a:rPr>
+              <a:t>State Information</a:t>
+            </a:r>
+          </a:p>
+        </p:txBody>
+      </p:sp>
+    </p:spTree>
+    <p:extLst>
+      <p:ext uri="{BB962C8B-B14F-4D97-AF65-F5344CB8AC3E}">
+        <p14:creationId xmlns:p14="http://schemas.microsoft.com/office/powerpoint/2010/main" val="807887994"/>
+      </p:ext>
+    </p:extLst>
+  </p:cSld>
+  <p:clrMapOvr>
+    <a:masterClrMapping/>
+  </p:clrMapOvr>
+</p:sld>
+</file>
+
+<file path=ppt/slides/slide66.xml><?xml version="1.0" encoding="utf-8"?>
+<p:sld xmlns:a="http://schemas.openxmlformats.org/drawingml/2006/main" xmlns:r="http://schemas.openxmlformats.org/officeDocument/2006/relationships" xmlns:p="http://schemas.openxmlformats.org/presentationml/2006/main">
+  <p:cSld>
+    <p:spTree>
+      <p:nvGrpSpPr>
+        <p:cNvPr id="1" name=""/>
+        <p:cNvGrpSpPr/>
+        <p:nvPr/>
+      </p:nvGrpSpPr>
+      <p:grpSpPr>
+        <a:xfrm>
+          <a:off x="0" y="0"/>
+          <a:ext cx="0" cy="0"/>
+          <a:chOff x="0" y="0"/>
+          <a:chExt cx="0" cy="0"/>
+        </a:xfrm>
+      </p:grpSpPr>
+      <p:sp>
+        <p:nvSpPr>
+          <p:cNvPr id="2" name="Slide Number Placeholder 1">
+            <a:extLst>
+              <a:ext uri="{FF2B5EF4-FFF2-40B4-BE49-F238E27FC236}">
+                <a16:creationId xmlns:a16="http://schemas.microsoft.com/office/drawing/2014/main" id="{4CF602FA-47FB-1C42-87F9-B1D80E651C85}"/>
+              </a:ext>
+            </a:extLst>
+          </p:cNvPr>
+          <p:cNvSpPr>
+            <a:spLocks noGrp="1"/>
+          </p:cNvSpPr>
+          <p:nvPr>
+            <p:ph type="sldNum" sz="quarter" idx="12"/>
+          </p:nvPr>
+        </p:nvSpPr>
+        <p:spPr/>
+        <p:txBody>
+          <a:bodyPr/>
+          <a:lstStyle/>
+          <a:p>
+            <a:fld id="{C554A706-D19D-4C79-97F9-BC489483F7EF}" type="slidenum">
+              <a:rPr lang="en-GB" smtClean="0"/>
+              <a:t>66</a:t>
+            </a:fld>
+            <a:endParaRPr lang="en-GB" dirty="0"/>
+          </a:p>
+        </p:txBody>
+      </p:sp>
+      <p:sp>
+        <p:nvSpPr>
+          <p:cNvPr id="3" name="Title 2">
+            <a:extLst>
+              <a:ext uri="{FF2B5EF4-FFF2-40B4-BE49-F238E27FC236}">
+                <a16:creationId xmlns:a16="http://schemas.microsoft.com/office/drawing/2014/main" id="{5C8F3E15-B13C-694D-8D0F-CC5DF81C9E0E}"/>
+              </a:ext>
+            </a:extLst>
+          </p:cNvPr>
+          <p:cNvSpPr>
+            <a:spLocks noGrp="1"/>
+          </p:cNvSpPr>
+          <p:nvPr>
+            <p:ph type="title"/>
+          </p:nvPr>
+        </p:nvSpPr>
+        <p:spPr>
+          <a:xfrm>
+            <a:off x="223838" y="118733"/>
+            <a:ext cx="6629400" cy="349618"/>
+          </a:xfrm>
+        </p:spPr>
+        <p:txBody>
+          <a:bodyPr/>
+          <a:lstStyle/>
+          <a:p>
+            <a:r>
+              <a:rPr lang="en-US" dirty="0"/>
+              <a:t>*65*</a:t>
+            </a:r>
+          </a:p>
+        </p:txBody>
+      </p:sp>
+      <p:sp>
+        <p:nvSpPr>
+          <p:cNvPr id="4" name="TextBox 3">
+            <a:extLst>
+              <a:ext uri="{FF2B5EF4-FFF2-40B4-BE49-F238E27FC236}">
+                <a16:creationId xmlns:a16="http://schemas.microsoft.com/office/drawing/2014/main" id="{C73B122E-5230-6243-A035-151EDB99E12E}"/>
+              </a:ext>
+            </a:extLst>
+          </p:cNvPr>
+          <p:cNvSpPr txBox="1"/>
+          <p:nvPr/>
+        </p:nvSpPr>
+        <p:spPr>
+          <a:xfrm>
+            <a:off x="223837" y="447345"/>
+            <a:ext cx="6892069" cy="328612"/>
+          </a:xfrm>
+          <a:prstGeom prst="rect">
+            <a:avLst/>
+          </a:prstGeom>
+          <a:noFill/>
+        </p:spPr>
+        <p:txBody>
+          <a:bodyPr wrap="square" lIns="0" tIns="0" rIns="0" bIns="0" rtlCol="0">
+            <a:noAutofit/>
+          </a:bodyPr>
+          <a:lstStyle/>
+          <a:p>
+            <a:r>
+              <a:rPr lang="en-GB" sz="1400" i="1" dirty="0">
+                <a:latin typeface="JLR Emeric SemiBold" panose="02000503040000020004" pitchFamily="2" charset="0"/>
+              </a:rPr>
+              <a:t>State Information</a:t>
+            </a:r>
+          </a:p>
+        </p:txBody>
+      </p:sp>
+    </p:spTree>
+    <p:extLst>
+      <p:ext uri="{BB962C8B-B14F-4D97-AF65-F5344CB8AC3E}">
+        <p14:creationId xmlns:p14="http://schemas.microsoft.com/office/powerpoint/2010/main" val="1158819608"/>
+      </p:ext>
+    </p:extLst>
+  </p:cSld>
+  <p:clrMapOvr>
+    <a:masterClrMapping/>
+  </p:clrMapOvr>
+</p:sld>
+</file>
+
+<file path=ppt/slides/slide67.xml><?xml version="1.0" encoding="utf-8"?>
+<p:sld xmlns:a="http://schemas.openxmlformats.org/drawingml/2006/main" xmlns:r="http://schemas.openxmlformats.org/officeDocument/2006/relationships" xmlns:p="http://schemas.openxmlformats.org/presentationml/2006/main">
+  <p:cSld>
+    <p:spTree>
+      <p:nvGrpSpPr>
+        <p:cNvPr id="1" name=""/>
+        <p:cNvGrpSpPr/>
+        <p:nvPr/>
+      </p:nvGrpSpPr>
+      <p:grpSpPr>
+        <a:xfrm>
+          <a:off x="0" y="0"/>
+          <a:ext cx="0" cy="0"/>
+          <a:chOff x="0" y="0"/>
+          <a:chExt cx="0" cy="0"/>
+        </a:xfrm>
+      </p:grpSpPr>
+      <p:sp>
+        <p:nvSpPr>
+          <p:cNvPr id="2" name="Slide Number Placeholder 1">
+            <a:extLst>
+              <a:ext uri="{FF2B5EF4-FFF2-40B4-BE49-F238E27FC236}">
+                <a16:creationId xmlns:a16="http://schemas.microsoft.com/office/drawing/2014/main" id="{4CF602FA-47FB-1C42-87F9-B1D80E651C85}"/>
+              </a:ext>
+            </a:extLst>
+          </p:cNvPr>
+          <p:cNvSpPr>
+            <a:spLocks noGrp="1"/>
+          </p:cNvSpPr>
+          <p:nvPr>
+            <p:ph type="sldNum" sz="quarter" idx="12"/>
+          </p:nvPr>
+        </p:nvSpPr>
+        <p:spPr/>
+        <p:txBody>
+          <a:bodyPr/>
+          <a:lstStyle/>
+          <a:p>
+            <a:fld id="{C554A706-D19D-4C79-97F9-BC489483F7EF}" type="slidenum">
+              <a:rPr lang="en-GB" smtClean="0"/>
+              <a:t>67</a:t>
+            </a:fld>
+            <a:endParaRPr lang="en-GB" dirty="0"/>
+          </a:p>
+        </p:txBody>
+      </p:sp>
+      <p:sp>
+        <p:nvSpPr>
+          <p:cNvPr id="3" name="Title 2">
+            <a:extLst>
+              <a:ext uri="{FF2B5EF4-FFF2-40B4-BE49-F238E27FC236}">
+                <a16:creationId xmlns:a16="http://schemas.microsoft.com/office/drawing/2014/main" id="{5C8F3E15-B13C-694D-8D0F-CC5DF81C9E0E}"/>
+              </a:ext>
+            </a:extLst>
+          </p:cNvPr>
+          <p:cNvSpPr>
+            <a:spLocks noGrp="1"/>
+          </p:cNvSpPr>
+          <p:nvPr>
+            <p:ph type="title"/>
+          </p:nvPr>
+        </p:nvSpPr>
+        <p:spPr>
+          <a:xfrm>
+            <a:off x="223838" y="118733"/>
+            <a:ext cx="6629400" cy="349618"/>
+          </a:xfrm>
+        </p:spPr>
+        <p:txBody>
+          <a:bodyPr/>
+          <a:lstStyle/>
+          <a:p>
+            <a:r>
+              <a:rPr lang="en-US" dirty="0"/>
+              <a:t>*66*</a:t>
+            </a:r>
+          </a:p>
+        </p:txBody>
+      </p:sp>
+      <p:sp>
+        <p:nvSpPr>
+          <p:cNvPr id="4" name="TextBox 3">
+            <a:extLst>
+              <a:ext uri="{FF2B5EF4-FFF2-40B4-BE49-F238E27FC236}">
+                <a16:creationId xmlns:a16="http://schemas.microsoft.com/office/drawing/2014/main" id="{C73B122E-5230-6243-A035-151EDB99E12E}"/>
+              </a:ext>
+            </a:extLst>
+          </p:cNvPr>
+          <p:cNvSpPr txBox="1"/>
+          <p:nvPr/>
+        </p:nvSpPr>
+        <p:spPr>
+          <a:xfrm>
+            <a:off x="223837" y="447345"/>
+            <a:ext cx="6892069" cy="328612"/>
+          </a:xfrm>
+          <a:prstGeom prst="rect">
+            <a:avLst/>
+          </a:prstGeom>
+          <a:noFill/>
+        </p:spPr>
+        <p:txBody>
+          <a:bodyPr wrap="square" lIns="0" tIns="0" rIns="0" bIns="0" rtlCol="0">
+            <a:noAutofit/>
+          </a:bodyPr>
+          <a:lstStyle/>
+          <a:p>
+            <a:r>
+              <a:rPr lang="en-GB" sz="1400" i="1" dirty="0">
+                <a:latin typeface="JLR Emeric SemiBold" panose="02000503040000020004" pitchFamily="2" charset="0"/>
+              </a:rPr>
+              <a:t>State Information</a:t>
+            </a:r>
+          </a:p>
+        </p:txBody>
+      </p:sp>
+    </p:spTree>
+    <p:extLst>
+      <p:ext uri="{BB962C8B-B14F-4D97-AF65-F5344CB8AC3E}">
+        <p14:creationId xmlns:p14="http://schemas.microsoft.com/office/powerpoint/2010/main" val="317223204"/>
+      </p:ext>
+    </p:extLst>
+  </p:cSld>
+  <p:clrMapOvr>
+    <a:masterClrMapping/>
+  </p:clrMapOvr>
+</p:sld>
+</file>
+
+<file path=ppt/slides/slide68.xml><?xml version="1.0" encoding="utf-8"?>
+<p:sld xmlns:a="http://schemas.openxmlformats.org/drawingml/2006/main" xmlns:r="http://schemas.openxmlformats.org/officeDocument/2006/relationships" xmlns:p="http://schemas.openxmlformats.org/presentationml/2006/main">
+  <p:cSld>
+    <p:spTree>
+      <p:nvGrpSpPr>
+        <p:cNvPr id="1" name=""/>
+        <p:cNvGrpSpPr/>
+        <p:nvPr/>
+      </p:nvGrpSpPr>
+      <p:grpSpPr>
+        <a:xfrm>
+          <a:off x="0" y="0"/>
+          <a:ext cx="0" cy="0"/>
+          <a:chOff x="0" y="0"/>
+          <a:chExt cx="0" cy="0"/>
+        </a:xfrm>
+      </p:grpSpPr>
+      <p:sp>
+        <p:nvSpPr>
+          <p:cNvPr id="2" name="Slide Number Placeholder 1">
+            <a:extLst>
+              <a:ext uri="{FF2B5EF4-FFF2-40B4-BE49-F238E27FC236}">
+                <a16:creationId xmlns:a16="http://schemas.microsoft.com/office/drawing/2014/main" id="{4CF602FA-47FB-1C42-87F9-B1D80E651C85}"/>
+              </a:ext>
+            </a:extLst>
+          </p:cNvPr>
+          <p:cNvSpPr>
+            <a:spLocks noGrp="1"/>
+          </p:cNvSpPr>
+          <p:nvPr>
+            <p:ph type="sldNum" sz="quarter" idx="12"/>
+          </p:nvPr>
+        </p:nvSpPr>
+        <p:spPr/>
+        <p:txBody>
+          <a:bodyPr/>
+          <a:lstStyle/>
+          <a:p>
+            <a:fld id="{C554A706-D19D-4C79-97F9-BC489483F7EF}" type="slidenum">
+              <a:rPr lang="en-GB" smtClean="0"/>
+              <a:t>68</a:t>
+            </a:fld>
+            <a:endParaRPr lang="en-GB" dirty="0"/>
+          </a:p>
+        </p:txBody>
+      </p:sp>
+      <p:sp>
+        <p:nvSpPr>
+          <p:cNvPr id="3" name="Title 2">
+            <a:extLst>
+              <a:ext uri="{FF2B5EF4-FFF2-40B4-BE49-F238E27FC236}">
+                <a16:creationId xmlns:a16="http://schemas.microsoft.com/office/drawing/2014/main" id="{5C8F3E15-B13C-694D-8D0F-CC5DF81C9E0E}"/>
+              </a:ext>
+            </a:extLst>
+          </p:cNvPr>
+          <p:cNvSpPr>
+            <a:spLocks noGrp="1"/>
+          </p:cNvSpPr>
+          <p:nvPr>
+            <p:ph type="title"/>
+          </p:nvPr>
+        </p:nvSpPr>
+        <p:spPr>
+          <a:xfrm>
+            <a:off x="223838" y="118733"/>
+            <a:ext cx="6629400" cy="349618"/>
+          </a:xfrm>
+        </p:spPr>
+        <p:txBody>
+          <a:bodyPr/>
+          <a:lstStyle/>
+          <a:p>
+            <a:r>
+              <a:rPr lang="en-US" dirty="0"/>
+              <a:t>*67*</a:t>
+            </a:r>
+          </a:p>
+        </p:txBody>
+      </p:sp>
+      <p:sp>
+        <p:nvSpPr>
+          <p:cNvPr id="4" name="TextBox 3">
+            <a:extLst>
+              <a:ext uri="{FF2B5EF4-FFF2-40B4-BE49-F238E27FC236}">
+                <a16:creationId xmlns:a16="http://schemas.microsoft.com/office/drawing/2014/main" id="{C73B122E-5230-6243-A035-151EDB99E12E}"/>
+              </a:ext>
+            </a:extLst>
+          </p:cNvPr>
+          <p:cNvSpPr txBox="1"/>
+          <p:nvPr/>
+        </p:nvSpPr>
+        <p:spPr>
+          <a:xfrm>
+            <a:off x="223837" y="447345"/>
+            <a:ext cx="6892069" cy="328612"/>
+          </a:xfrm>
+          <a:prstGeom prst="rect">
+            <a:avLst/>
+          </a:prstGeom>
+          <a:noFill/>
+        </p:spPr>
+        <p:txBody>
+          <a:bodyPr wrap="square" lIns="0" tIns="0" rIns="0" bIns="0" rtlCol="0">
+            <a:noAutofit/>
+          </a:bodyPr>
+          <a:lstStyle/>
+          <a:p>
+            <a:r>
+              <a:rPr lang="en-GB" sz="1400" i="1" dirty="0">
+                <a:latin typeface="JLR Emeric SemiBold" panose="02000503040000020004" pitchFamily="2" charset="0"/>
+              </a:rPr>
+              <a:t>State Information</a:t>
+            </a:r>
+          </a:p>
+        </p:txBody>
+      </p:sp>
+    </p:spTree>
+    <p:extLst>
+      <p:ext uri="{BB962C8B-B14F-4D97-AF65-F5344CB8AC3E}">
+        <p14:creationId xmlns:p14="http://schemas.microsoft.com/office/powerpoint/2010/main" val="3355552472"/>
+      </p:ext>
+    </p:extLst>
+  </p:cSld>
+  <p:clrMapOvr>
+    <a:masterClrMapping/>
+  </p:clrMapOvr>
+</p:sld>
+</file>
+
+<file path=ppt/slides/slide69.xml><?xml version="1.0" encoding="utf-8"?>
+<p:sld xmlns:a="http://schemas.openxmlformats.org/drawingml/2006/main" xmlns:r="http://schemas.openxmlformats.org/officeDocument/2006/relationships" xmlns:p="http://schemas.openxmlformats.org/presentationml/2006/main">
+  <p:cSld>
+    <p:spTree>
+      <p:nvGrpSpPr>
+        <p:cNvPr id="1" name=""/>
+        <p:cNvGrpSpPr/>
+        <p:nvPr/>
+      </p:nvGrpSpPr>
+      <p:grpSpPr>
+        <a:xfrm>
+          <a:off x="0" y="0"/>
+          <a:ext cx="0" cy="0"/>
+          <a:chOff x="0" y="0"/>
+          <a:chExt cx="0" cy="0"/>
+        </a:xfrm>
+      </p:grpSpPr>
+      <p:sp>
+        <p:nvSpPr>
+          <p:cNvPr id="2" name="Slide Number Placeholder 1">
+            <a:extLst>
+              <a:ext uri="{FF2B5EF4-FFF2-40B4-BE49-F238E27FC236}">
+                <a16:creationId xmlns:a16="http://schemas.microsoft.com/office/drawing/2014/main" id="{4CF602FA-47FB-1C42-87F9-B1D80E651C85}"/>
+              </a:ext>
+            </a:extLst>
+          </p:cNvPr>
+          <p:cNvSpPr>
+            <a:spLocks noGrp="1"/>
+          </p:cNvSpPr>
+          <p:nvPr>
+            <p:ph type="sldNum" sz="quarter" idx="12"/>
+          </p:nvPr>
+        </p:nvSpPr>
+        <p:spPr/>
+        <p:txBody>
+          <a:bodyPr/>
+          <a:lstStyle/>
+          <a:p>
+            <a:fld id="{C554A706-D19D-4C79-97F9-BC489483F7EF}" type="slidenum">
+              <a:rPr lang="en-GB" smtClean="0"/>
+              <a:t>69</a:t>
+            </a:fld>
+            <a:endParaRPr lang="en-GB" dirty="0"/>
+          </a:p>
+        </p:txBody>
+      </p:sp>
+      <p:sp>
+        <p:nvSpPr>
+          <p:cNvPr id="3" name="Title 2">
+            <a:extLst>
+              <a:ext uri="{FF2B5EF4-FFF2-40B4-BE49-F238E27FC236}">
+                <a16:creationId xmlns:a16="http://schemas.microsoft.com/office/drawing/2014/main" id="{5C8F3E15-B13C-694D-8D0F-CC5DF81C9E0E}"/>
+              </a:ext>
+            </a:extLst>
+          </p:cNvPr>
+          <p:cNvSpPr>
+            <a:spLocks noGrp="1"/>
+          </p:cNvSpPr>
+          <p:nvPr>
+            <p:ph type="title"/>
+          </p:nvPr>
+        </p:nvSpPr>
+        <p:spPr>
+          <a:xfrm>
+            <a:off x="223838" y="118733"/>
+            <a:ext cx="6629400" cy="349618"/>
+          </a:xfrm>
+        </p:spPr>
+        <p:txBody>
+          <a:bodyPr/>
+          <a:lstStyle/>
+          <a:p>
+            <a:r>
+              <a:rPr lang="en-US" dirty="0"/>
+              <a:t>*68*</a:t>
+            </a:r>
+          </a:p>
+        </p:txBody>
+      </p:sp>
+      <p:sp>
+        <p:nvSpPr>
+          <p:cNvPr id="4" name="TextBox 3">
+            <a:extLst>
+              <a:ext uri="{FF2B5EF4-FFF2-40B4-BE49-F238E27FC236}">
+                <a16:creationId xmlns:a16="http://schemas.microsoft.com/office/drawing/2014/main" id="{C73B122E-5230-6243-A035-151EDB99E12E}"/>
+              </a:ext>
+            </a:extLst>
+          </p:cNvPr>
+          <p:cNvSpPr txBox="1"/>
+          <p:nvPr/>
+        </p:nvSpPr>
+        <p:spPr>
+          <a:xfrm>
+            <a:off x="223837" y="447345"/>
+            <a:ext cx="6892069" cy="328612"/>
+          </a:xfrm>
+          <a:prstGeom prst="rect">
+            <a:avLst/>
+          </a:prstGeom>
+          <a:noFill/>
+        </p:spPr>
+        <p:txBody>
+          <a:bodyPr wrap="square" lIns="0" tIns="0" rIns="0" bIns="0" rtlCol="0">
+            <a:noAutofit/>
+          </a:bodyPr>
+          <a:lstStyle/>
+          <a:p>
+            <a:r>
+              <a:rPr lang="en-GB" sz="1400" i="1" dirty="0">
+                <a:latin typeface="JLR Emeric SemiBold" panose="02000503040000020004" pitchFamily="2" charset="0"/>
+              </a:rPr>
+              <a:t>State Information</a:t>
+            </a:r>
+          </a:p>
+        </p:txBody>
+      </p:sp>
+    </p:spTree>
+    <p:extLst>
+      <p:ext uri="{BB962C8B-B14F-4D97-AF65-F5344CB8AC3E}">
+        <p14:creationId xmlns:p14="http://schemas.microsoft.com/office/powerpoint/2010/main" val="2656494178"/>
+      </p:ext>
+    </p:extLst>
+  </p:cSld>
+  <p:clrMapOvr>
+    <a:masterClrMapping/>
+  </p:clrMapOvr>
+</p:sld>
+</file>
+
 <file path=ppt/slides/slide7.xml><?xml version="1.0" encoding="utf-8"?>
 <p:sld xmlns:a="http://schemas.openxmlformats.org/drawingml/2006/main" xmlns:r="http://schemas.openxmlformats.org/officeDocument/2006/relationships" xmlns:p="http://schemas.openxmlformats.org/presentationml/2006/main">
   <p:cSld>
@@ -10332,6 +12715,353 @@
     <p:extLst>
       <p:ext uri="{BB962C8B-B14F-4D97-AF65-F5344CB8AC3E}">
         <p14:creationId xmlns:p14="http://schemas.microsoft.com/office/powerpoint/2010/main" val="3721927233"/>
+      </p:ext>
+    </p:extLst>
+  </p:cSld>
+  <p:clrMapOvr>
+    <a:masterClrMapping/>
+  </p:clrMapOvr>
+</p:sld>
+</file>
+
+<file path=ppt/slides/slide70.xml><?xml version="1.0" encoding="utf-8"?>
+<p:sld xmlns:a="http://schemas.openxmlformats.org/drawingml/2006/main" xmlns:r="http://schemas.openxmlformats.org/officeDocument/2006/relationships" xmlns:p="http://schemas.openxmlformats.org/presentationml/2006/main">
+  <p:cSld>
+    <p:spTree>
+      <p:nvGrpSpPr>
+        <p:cNvPr id="1" name=""/>
+        <p:cNvGrpSpPr/>
+        <p:nvPr/>
+      </p:nvGrpSpPr>
+      <p:grpSpPr>
+        <a:xfrm>
+          <a:off x="0" y="0"/>
+          <a:ext cx="0" cy="0"/>
+          <a:chOff x="0" y="0"/>
+          <a:chExt cx="0" cy="0"/>
+        </a:xfrm>
+      </p:grpSpPr>
+      <p:sp>
+        <p:nvSpPr>
+          <p:cNvPr id="2" name="Slide Number Placeholder 1">
+            <a:extLst>
+              <a:ext uri="{FF2B5EF4-FFF2-40B4-BE49-F238E27FC236}">
+                <a16:creationId xmlns:a16="http://schemas.microsoft.com/office/drawing/2014/main" id="{4CF602FA-47FB-1C42-87F9-B1D80E651C85}"/>
+              </a:ext>
+            </a:extLst>
+          </p:cNvPr>
+          <p:cNvSpPr>
+            <a:spLocks noGrp="1"/>
+          </p:cNvSpPr>
+          <p:nvPr>
+            <p:ph type="sldNum" sz="quarter" idx="12"/>
+          </p:nvPr>
+        </p:nvSpPr>
+        <p:spPr/>
+        <p:txBody>
+          <a:bodyPr/>
+          <a:lstStyle/>
+          <a:p>
+            <a:fld id="{C554A706-D19D-4C79-97F9-BC489483F7EF}" type="slidenum">
+              <a:rPr lang="en-GB" smtClean="0"/>
+              <a:t>70</a:t>
+            </a:fld>
+            <a:endParaRPr lang="en-GB" dirty="0"/>
+          </a:p>
+        </p:txBody>
+      </p:sp>
+      <p:sp>
+        <p:nvSpPr>
+          <p:cNvPr id="3" name="Title 2">
+            <a:extLst>
+              <a:ext uri="{FF2B5EF4-FFF2-40B4-BE49-F238E27FC236}">
+                <a16:creationId xmlns:a16="http://schemas.microsoft.com/office/drawing/2014/main" id="{5C8F3E15-B13C-694D-8D0F-CC5DF81C9E0E}"/>
+              </a:ext>
+            </a:extLst>
+          </p:cNvPr>
+          <p:cNvSpPr>
+            <a:spLocks noGrp="1"/>
+          </p:cNvSpPr>
+          <p:nvPr>
+            <p:ph type="title"/>
+          </p:nvPr>
+        </p:nvSpPr>
+        <p:spPr>
+          <a:xfrm>
+            <a:off x="223838" y="118733"/>
+            <a:ext cx="6629400" cy="349618"/>
+          </a:xfrm>
+        </p:spPr>
+        <p:txBody>
+          <a:bodyPr/>
+          <a:lstStyle/>
+          <a:p>
+            <a:r>
+              <a:rPr lang="en-US" dirty="0"/>
+              <a:t>*69*</a:t>
+            </a:r>
+          </a:p>
+        </p:txBody>
+      </p:sp>
+      <p:sp>
+        <p:nvSpPr>
+          <p:cNvPr id="4" name="TextBox 3">
+            <a:extLst>
+              <a:ext uri="{FF2B5EF4-FFF2-40B4-BE49-F238E27FC236}">
+                <a16:creationId xmlns:a16="http://schemas.microsoft.com/office/drawing/2014/main" id="{C73B122E-5230-6243-A035-151EDB99E12E}"/>
+              </a:ext>
+            </a:extLst>
+          </p:cNvPr>
+          <p:cNvSpPr txBox="1"/>
+          <p:nvPr/>
+        </p:nvSpPr>
+        <p:spPr>
+          <a:xfrm>
+            <a:off x="223837" y="447345"/>
+            <a:ext cx="6892069" cy="328612"/>
+          </a:xfrm>
+          <a:prstGeom prst="rect">
+            <a:avLst/>
+          </a:prstGeom>
+          <a:noFill/>
+        </p:spPr>
+        <p:txBody>
+          <a:bodyPr wrap="square" lIns="0" tIns="0" rIns="0" bIns="0" rtlCol="0">
+            <a:noAutofit/>
+          </a:bodyPr>
+          <a:lstStyle/>
+          <a:p>
+            <a:r>
+              <a:rPr lang="en-GB" sz="1400" i="1" dirty="0">
+                <a:latin typeface="JLR Emeric SemiBold" panose="02000503040000020004" pitchFamily="2" charset="0"/>
+              </a:rPr>
+              <a:t>State Information</a:t>
+            </a:r>
+          </a:p>
+        </p:txBody>
+      </p:sp>
+    </p:spTree>
+    <p:extLst>
+      <p:ext uri="{BB962C8B-B14F-4D97-AF65-F5344CB8AC3E}">
+        <p14:creationId xmlns:p14="http://schemas.microsoft.com/office/powerpoint/2010/main" val="2387082434"/>
+      </p:ext>
+    </p:extLst>
+  </p:cSld>
+  <p:clrMapOvr>
+    <a:masterClrMapping/>
+  </p:clrMapOvr>
+</p:sld>
+</file>
+
+<file path=ppt/slides/slide71.xml><?xml version="1.0" encoding="utf-8"?>
+<p:sld xmlns:a="http://schemas.openxmlformats.org/drawingml/2006/main" xmlns:r="http://schemas.openxmlformats.org/officeDocument/2006/relationships" xmlns:p="http://schemas.openxmlformats.org/presentationml/2006/main">
+  <p:cSld>
+    <p:spTree>
+      <p:nvGrpSpPr>
+        <p:cNvPr id="1" name=""/>
+        <p:cNvGrpSpPr/>
+        <p:nvPr/>
+      </p:nvGrpSpPr>
+      <p:grpSpPr>
+        <a:xfrm>
+          <a:off x="0" y="0"/>
+          <a:ext cx="0" cy="0"/>
+          <a:chOff x="0" y="0"/>
+          <a:chExt cx="0" cy="0"/>
+        </a:xfrm>
+      </p:grpSpPr>
+      <p:sp>
+        <p:nvSpPr>
+          <p:cNvPr id="2" name="Slide Number Placeholder 1">
+            <a:extLst>
+              <a:ext uri="{FF2B5EF4-FFF2-40B4-BE49-F238E27FC236}">
+                <a16:creationId xmlns:a16="http://schemas.microsoft.com/office/drawing/2014/main" id="{4CF602FA-47FB-1C42-87F9-B1D80E651C85}"/>
+              </a:ext>
+            </a:extLst>
+          </p:cNvPr>
+          <p:cNvSpPr>
+            <a:spLocks noGrp="1"/>
+          </p:cNvSpPr>
+          <p:nvPr>
+            <p:ph type="sldNum" sz="quarter" idx="12"/>
+          </p:nvPr>
+        </p:nvSpPr>
+        <p:spPr/>
+        <p:txBody>
+          <a:bodyPr/>
+          <a:lstStyle/>
+          <a:p>
+            <a:fld id="{C554A706-D19D-4C79-97F9-BC489483F7EF}" type="slidenum">
+              <a:rPr lang="en-GB" smtClean="0"/>
+              <a:t>71</a:t>
+            </a:fld>
+            <a:endParaRPr lang="en-GB" dirty="0"/>
+          </a:p>
+        </p:txBody>
+      </p:sp>
+      <p:sp>
+        <p:nvSpPr>
+          <p:cNvPr id="3" name="Title 2">
+            <a:extLst>
+              <a:ext uri="{FF2B5EF4-FFF2-40B4-BE49-F238E27FC236}">
+                <a16:creationId xmlns:a16="http://schemas.microsoft.com/office/drawing/2014/main" id="{5C8F3E15-B13C-694D-8D0F-CC5DF81C9E0E}"/>
+              </a:ext>
+            </a:extLst>
+          </p:cNvPr>
+          <p:cNvSpPr>
+            <a:spLocks noGrp="1"/>
+          </p:cNvSpPr>
+          <p:nvPr>
+            <p:ph type="title"/>
+          </p:nvPr>
+        </p:nvSpPr>
+        <p:spPr>
+          <a:xfrm>
+            <a:off x="223838" y="118733"/>
+            <a:ext cx="6629400" cy="349618"/>
+          </a:xfrm>
+        </p:spPr>
+        <p:txBody>
+          <a:bodyPr/>
+          <a:lstStyle/>
+          <a:p>
+            <a:r>
+              <a:rPr lang="en-US" dirty="0"/>
+              <a:t>*70*</a:t>
+            </a:r>
+          </a:p>
+        </p:txBody>
+      </p:sp>
+      <p:sp>
+        <p:nvSpPr>
+          <p:cNvPr id="4" name="TextBox 3">
+            <a:extLst>
+              <a:ext uri="{FF2B5EF4-FFF2-40B4-BE49-F238E27FC236}">
+                <a16:creationId xmlns:a16="http://schemas.microsoft.com/office/drawing/2014/main" id="{C73B122E-5230-6243-A035-151EDB99E12E}"/>
+              </a:ext>
+            </a:extLst>
+          </p:cNvPr>
+          <p:cNvSpPr txBox="1"/>
+          <p:nvPr/>
+        </p:nvSpPr>
+        <p:spPr>
+          <a:xfrm>
+            <a:off x="223837" y="447345"/>
+            <a:ext cx="6892069" cy="328612"/>
+          </a:xfrm>
+          <a:prstGeom prst="rect">
+            <a:avLst/>
+          </a:prstGeom>
+          <a:noFill/>
+        </p:spPr>
+        <p:txBody>
+          <a:bodyPr wrap="square" lIns="0" tIns="0" rIns="0" bIns="0" rtlCol="0">
+            <a:noAutofit/>
+          </a:bodyPr>
+          <a:lstStyle/>
+          <a:p>
+            <a:r>
+              <a:rPr lang="en-GB" sz="1400" i="1" dirty="0">
+                <a:latin typeface="JLR Emeric SemiBold" panose="02000503040000020004" pitchFamily="2" charset="0"/>
+              </a:rPr>
+              <a:t>State Information</a:t>
+            </a:r>
+          </a:p>
+        </p:txBody>
+      </p:sp>
+    </p:spTree>
+    <p:extLst>
+      <p:ext uri="{BB962C8B-B14F-4D97-AF65-F5344CB8AC3E}">
+        <p14:creationId xmlns:p14="http://schemas.microsoft.com/office/powerpoint/2010/main" val="3591975285"/>
+      </p:ext>
+    </p:extLst>
+  </p:cSld>
+  <p:clrMapOvr>
+    <a:masterClrMapping/>
+  </p:clrMapOvr>
+</p:sld>
+</file>
+
+<file path=ppt/slides/slide72.xml><?xml version="1.0" encoding="utf-8"?>
+<p:sld xmlns:a="http://schemas.openxmlformats.org/drawingml/2006/main" xmlns:r="http://schemas.openxmlformats.org/officeDocument/2006/relationships" xmlns:p="http://schemas.openxmlformats.org/presentationml/2006/main">
+  <p:cSld>
+    <p:spTree>
+      <p:nvGrpSpPr>
+        <p:cNvPr id="1" name=""/>
+        <p:cNvGrpSpPr/>
+        <p:nvPr/>
+      </p:nvGrpSpPr>
+      <p:grpSpPr>
+        <a:xfrm>
+          <a:off x="0" y="0"/>
+          <a:ext cx="0" cy="0"/>
+          <a:chOff x="0" y="0"/>
+          <a:chExt cx="0" cy="0"/>
+        </a:xfrm>
+      </p:grpSpPr>
+      <p:sp>
+        <p:nvSpPr>
+          <p:cNvPr id="2" name="Slide Number Placeholder 1">
+            <a:extLst>
+              <a:ext uri="{FF2B5EF4-FFF2-40B4-BE49-F238E27FC236}">
+                <a16:creationId xmlns:a16="http://schemas.microsoft.com/office/drawing/2014/main" id="{4CF602FA-47FB-1C42-87F9-B1D80E651C85}"/>
+              </a:ext>
+            </a:extLst>
+          </p:cNvPr>
+          <p:cNvSpPr>
+            <a:spLocks noGrp="1"/>
+          </p:cNvSpPr>
+          <p:nvPr>
+            <p:ph type="sldNum" sz="quarter" idx="12"/>
+          </p:nvPr>
+        </p:nvSpPr>
+        <p:spPr/>
+        <p:txBody>
+          <a:bodyPr/>
+          <a:lstStyle/>
+          <a:p>
+            <a:fld id="{C554A706-D19D-4C79-97F9-BC489483F7EF}" type="slidenum">
+              <a:rPr lang="en-GB" smtClean="0"/>
+              <a:t>72</a:t>
+            </a:fld>
+            <a:endParaRPr lang="en-GB" dirty="0"/>
+          </a:p>
+        </p:txBody>
+      </p:sp>
+      <p:sp>
+        <p:nvSpPr>
+          <p:cNvPr id="3" name="Title 2">
+            <a:extLst>
+              <a:ext uri="{FF2B5EF4-FFF2-40B4-BE49-F238E27FC236}">
+                <a16:creationId xmlns:a16="http://schemas.microsoft.com/office/drawing/2014/main" id="{5C8F3E15-B13C-694D-8D0F-CC5DF81C9E0E}"/>
+              </a:ext>
+            </a:extLst>
+          </p:cNvPr>
+          <p:cNvSpPr>
+            <a:spLocks noGrp="1"/>
+          </p:cNvSpPr>
+          <p:nvPr>
+            <p:ph type="title"/>
+          </p:nvPr>
+        </p:nvSpPr>
+        <p:spPr>
+          <a:xfrm>
+            <a:off x="223838" y="118733"/>
+            <a:ext cx="6629400" cy="349618"/>
+          </a:xfrm>
+        </p:spPr>
+        <p:txBody>
+          <a:bodyPr/>
+          <a:lstStyle/>
+          <a:p>
+            <a:endParaRPr lang="en-US" dirty="0"/>
+          </a:p>
+        </p:txBody>
+      </p:sp>
+    </p:spTree>
+    <p:extLst>
+      <p:ext uri="{BB962C8B-B14F-4D97-AF65-F5344CB8AC3E}">
+        <p14:creationId xmlns:p14="http://schemas.microsoft.com/office/powerpoint/2010/main" val="747518252"/>
       </p:ext>
     </p:extLst>
   </p:cSld>

</xml_diff>